<commit_message>
Modify slide and add result G9
</commit_message>
<xml_diff>
--- a/OpenCBLS/src/khmtk60/miniprojects/G9/Bao cao G9.pptx
+++ b/OpenCBLS/src/khmtk60/miniprojects/G9/Bao cao G9.pptx
@@ -18,6 +18,10 @@
     <p:sldId id="265" r:id="rId13"/>
     <p:sldId id="266" r:id="rId14"/>
     <p:sldId id="267" r:id="rId15"/>
+    <p:sldId id="268" r:id="rId16"/>
+    <p:sldId id="269" r:id="rId17"/>
+    <p:sldId id="270" r:id="rId18"/>
+    <p:sldId id="271" r:id="rId19"/>
   </p:sldIdLst>
   <p:sldSz cx="9144000" cy="6858000"/>
   <p:notesSz cx="7559675" cy="10691812"/>
@@ -85,10 +89,8 @@
         <p:txBody>
           <a:bodyPr lIns="0" rIns="0" tIns="0" bIns="0" anchor="ctr"/>
           <a:p>
-            <a:endParaRPr b="0" lang="en-US" sz="1800" spc="-1" strike="noStrike">
-              <a:solidFill>
-                <a:srgbClr val="000000"/>
-              </a:solidFill>
+            <a:pPr algn="ctr"/>
+            <a:endParaRPr b="0" lang="en-US" sz="4400" spc="-1" strike="noStrike">
               <a:latin typeface="Arial"/>
             </a:endParaRPr>
           </a:p>
@@ -118,10 +120,7 @@
             <a:normAutofit/>
           </a:bodyPr>
           <a:p>
-            <a:endParaRPr b="0" lang="en-US" sz="2800" spc="-1" strike="noStrike">
-              <a:solidFill>
-                <a:srgbClr val="000000"/>
-              </a:solidFill>
+            <a:endParaRPr b="0" lang="en-US" sz="3200" spc="-1" strike="noStrike">
               <a:latin typeface="Arial"/>
             </a:endParaRPr>
           </a:p>
@@ -151,10 +150,7 @@
             <a:normAutofit/>
           </a:bodyPr>
           <a:p>
-            <a:endParaRPr b="0" lang="en-US" sz="2800" spc="-1" strike="noStrike">
-              <a:solidFill>
-                <a:srgbClr val="000000"/>
-              </a:solidFill>
+            <a:endParaRPr b="0" lang="en-US" sz="3200" spc="-1" strike="noStrike">
               <a:latin typeface="Arial"/>
             </a:endParaRPr>
           </a:p>
@@ -204,10 +200,8 @@
         <p:txBody>
           <a:bodyPr lIns="0" rIns="0" tIns="0" bIns="0" anchor="ctr"/>
           <a:p>
-            <a:endParaRPr b="0" lang="en-US" sz="1800" spc="-1" strike="noStrike">
-              <a:solidFill>
-                <a:srgbClr val="000000"/>
-              </a:solidFill>
+            <a:pPr algn="ctr"/>
+            <a:endParaRPr b="0" lang="en-US" sz="4400" spc="-1" strike="noStrike">
               <a:latin typeface="Arial"/>
             </a:endParaRPr>
           </a:p>
@@ -237,10 +231,7 @@
             <a:normAutofit/>
           </a:bodyPr>
           <a:p>
-            <a:endParaRPr b="0" lang="en-US" sz="2800" spc="-1" strike="noStrike">
-              <a:solidFill>
-                <a:srgbClr val="000000"/>
-              </a:solidFill>
+            <a:endParaRPr b="0" lang="en-US" sz="3200" spc="-1" strike="noStrike">
               <a:latin typeface="Arial"/>
             </a:endParaRPr>
           </a:p>
@@ -270,10 +261,7 @@
             <a:normAutofit/>
           </a:bodyPr>
           <a:p>
-            <a:endParaRPr b="0" lang="en-US" sz="2800" spc="-1" strike="noStrike">
-              <a:solidFill>
-                <a:srgbClr val="000000"/>
-              </a:solidFill>
+            <a:endParaRPr b="0" lang="en-US" sz="3200" spc="-1" strike="noStrike">
               <a:latin typeface="Arial"/>
             </a:endParaRPr>
           </a:p>
@@ -303,10 +291,7 @@
             <a:normAutofit/>
           </a:bodyPr>
           <a:p>
-            <a:endParaRPr b="0" lang="en-US" sz="2800" spc="-1" strike="noStrike">
-              <a:solidFill>
-                <a:srgbClr val="000000"/>
-              </a:solidFill>
+            <a:endParaRPr b="0" lang="en-US" sz="3200" spc="-1" strike="noStrike">
               <a:latin typeface="Arial"/>
             </a:endParaRPr>
           </a:p>
@@ -336,10 +321,7 @@
             <a:normAutofit/>
           </a:bodyPr>
           <a:p>
-            <a:endParaRPr b="0" lang="en-US" sz="2800" spc="-1" strike="noStrike">
-              <a:solidFill>
-                <a:srgbClr val="000000"/>
-              </a:solidFill>
+            <a:endParaRPr b="0" lang="en-US" sz="3200" spc="-1" strike="noStrike">
               <a:latin typeface="Arial"/>
             </a:endParaRPr>
           </a:p>
@@ -389,10 +371,8 @@
         <p:txBody>
           <a:bodyPr lIns="0" rIns="0" tIns="0" bIns="0" anchor="ctr"/>
           <a:p>
-            <a:endParaRPr b="0" lang="en-US" sz="1800" spc="-1" strike="noStrike">
-              <a:solidFill>
-                <a:srgbClr val="000000"/>
-              </a:solidFill>
+            <a:pPr algn="ctr"/>
+            <a:endParaRPr b="0" lang="en-US" sz="4400" spc="-1" strike="noStrike">
               <a:latin typeface="Arial"/>
             </a:endParaRPr>
           </a:p>
@@ -422,10 +402,7 @@
             <a:normAutofit/>
           </a:bodyPr>
           <a:p>
-            <a:endParaRPr b="0" lang="en-US" sz="2800" spc="-1" strike="noStrike">
-              <a:solidFill>
-                <a:srgbClr val="000000"/>
-              </a:solidFill>
+            <a:endParaRPr b="0" lang="en-US" sz="3200" spc="-1" strike="noStrike">
               <a:latin typeface="Arial"/>
             </a:endParaRPr>
           </a:p>
@@ -455,10 +432,7 @@
             <a:normAutofit/>
           </a:bodyPr>
           <a:p>
-            <a:endParaRPr b="0" lang="en-US" sz="2800" spc="-1" strike="noStrike">
-              <a:solidFill>
-                <a:srgbClr val="000000"/>
-              </a:solidFill>
+            <a:endParaRPr b="0" lang="en-US" sz="3200" spc="-1" strike="noStrike">
               <a:latin typeface="Arial"/>
             </a:endParaRPr>
           </a:p>
@@ -488,10 +462,7 @@
             <a:normAutofit/>
           </a:bodyPr>
           <a:p>
-            <a:endParaRPr b="0" lang="en-US" sz="2800" spc="-1" strike="noStrike">
-              <a:solidFill>
-                <a:srgbClr val="000000"/>
-              </a:solidFill>
+            <a:endParaRPr b="0" lang="en-US" sz="3200" spc="-1" strike="noStrike">
               <a:latin typeface="Arial"/>
             </a:endParaRPr>
           </a:p>
@@ -521,10 +492,7 @@
             <a:normAutofit/>
           </a:bodyPr>
           <a:p>
-            <a:endParaRPr b="0" lang="en-US" sz="2800" spc="-1" strike="noStrike">
-              <a:solidFill>
-                <a:srgbClr val="000000"/>
-              </a:solidFill>
+            <a:endParaRPr b="0" lang="en-US" sz="3200" spc="-1" strike="noStrike">
               <a:latin typeface="Arial"/>
             </a:endParaRPr>
           </a:p>
@@ -554,10 +522,7 @@
             <a:normAutofit/>
           </a:bodyPr>
           <a:p>
-            <a:endParaRPr b="0" lang="en-US" sz="2800" spc="-1" strike="noStrike">
-              <a:solidFill>
-                <a:srgbClr val="000000"/>
-              </a:solidFill>
+            <a:endParaRPr b="0" lang="en-US" sz="3200" spc="-1" strike="noStrike">
               <a:latin typeface="Arial"/>
             </a:endParaRPr>
           </a:p>
@@ -587,10 +552,7 @@
             <a:normAutofit/>
           </a:bodyPr>
           <a:p>
-            <a:endParaRPr b="0" lang="en-US" sz="2800" spc="-1" strike="noStrike">
-              <a:solidFill>
-                <a:srgbClr val="000000"/>
-              </a:solidFill>
+            <a:endParaRPr b="0" lang="en-US" sz="3200" spc="-1" strike="noStrike">
               <a:latin typeface="Arial"/>
             </a:endParaRPr>
           </a:p>
@@ -662,10 +624,8 @@
         <p:txBody>
           <a:bodyPr lIns="0" rIns="0" tIns="0" bIns="0" anchor="ctr"/>
           <a:p>
-            <a:endParaRPr b="0" lang="en-US" sz="1800" spc="-1" strike="noStrike">
-              <a:solidFill>
-                <a:srgbClr val="000000"/>
-              </a:solidFill>
+            <a:pPr algn="ctr"/>
+            <a:endParaRPr b="0" lang="en-US" sz="4400" spc="-1" strike="noStrike">
               <a:latin typeface="Arial"/>
             </a:endParaRPr>
           </a:p>
@@ -744,10 +704,8 @@
         <p:txBody>
           <a:bodyPr lIns="0" rIns="0" tIns="0" bIns="0" anchor="ctr"/>
           <a:p>
-            <a:endParaRPr b="0" lang="en-US" sz="1800" spc="-1" strike="noStrike">
-              <a:solidFill>
-                <a:srgbClr val="000000"/>
-              </a:solidFill>
+            <a:pPr algn="ctr"/>
+            <a:endParaRPr b="0" lang="en-US" sz="4400" spc="-1" strike="noStrike">
               <a:latin typeface="Arial"/>
             </a:endParaRPr>
           </a:p>
@@ -777,10 +735,7 @@
             <a:normAutofit/>
           </a:bodyPr>
           <a:p>
-            <a:endParaRPr b="0" lang="en-US" sz="2800" spc="-1" strike="noStrike">
-              <a:solidFill>
-                <a:srgbClr val="000000"/>
-              </a:solidFill>
+            <a:endParaRPr b="0" lang="en-US" sz="3200" spc="-1" strike="noStrike">
               <a:latin typeface="Arial"/>
             </a:endParaRPr>
           </a:p>
@@ -830,10 +785,8 @@
         <p:txBody>
           <a:bodyPr lIns="0" rIns="0" tIns="0" bIns="0" anchor="ctr"/>
           <a:p>
-            <a:endParaRPr b="0" lang="en-US" sz="1800" spc="-1" strike="noStrike">
-              <a:solidFill>
-                <a:srgbClr val="000000"/>
-              </a:solidFill>
+            <a:pPr algn="ctr"/>
+            <a:endParaRPr b="0" lang="en-US" sz="4400" spc="-1" strike="noStrike">
               <a:latin typeface="Arial"/>
             </a:endParaRPr>
           </a:p>
@@ -863,10 +816,7 @@
             <a:normAutofit/>
           </a:bodyPr>
           <a:p>
-            <a:endParaRPr b="0" lang="en-US" sz="2800" spc="-1" strike="noStrike">
-              <a:solidFill>
-                <a:srgbClr val="000000"/>
-              </a:solidFill>
+            <a:endParaRPr b="0" lang="en-US" sz="3200" spc="-1" strike="noStrike">
               <a:latin typeface="Arial"/>
             </a:endParaRPr>
           </a:p>
@@ -896,10 +846,7 @@
             <a:normAutofit/>
           </a:bodyPr>
           <a:p>
-            <a:endParaRPr b="0" lang="en-US" sz="2800" spc="-1" strike="noStrike">
-              <a:solidFill>
-                <a:srgbClr val="000000"/>
-              </a:solidFill>
+            <a:endParaRPr b="0" lang="en-US" sz="3200" spc="-1" strike="noStrike">
               <a:latin typeface="Arial"/>
             </a:endParaRPr>
           </a:p>
@@ -949,10 +896,8 @@
         <p:txBody>
           <a:bodyPr lIns="0" rIns="0" tIns="0" bIns="0" anchor="ctr"/>
           <a:p>
-            <a:endParaRPr b="0" lang="en-US" sz="1800" spc="-1" strike="noStrike">
-              <a:solidFill>
-                <a:srgbClr val="000000"/>
-              </a:solidFill>
+            <a:pPr algn="ctr"/>
+            <a:endParaRPr b="0" lang="en-US" sz="4400" spc="-1" strike="noStrike">
               <a:latin typeface="Arial"/>
             </a:endParaRPr>
           </a:p>
@@ -1053,10 +998,8 @@
         <p:txBody>
           <a:bodyPr lIns="0" rIns="0" tIns="0" bIns="0" anchor="ctr"/>
           <a:p>
-            <a:endParaRPr b="0" lang="en-US" sz="1800" spc="-1" strike="noStrike">
-              <a:solidFill>
-                <a:srgbClr val="000000"/>
-              </a:solidFill>
+            <a:pPr algn="ctr"/>
+            <a:endParaRPr b="0" lang="en-US" sz="4400" spc="-1" strike="noStrike">
               <a:latin typeface="Arial"/>
             </a:endParaRPr>
           </a:p>
@@ -1086,10 +1029,7 @@
             <a:normAutofit/>
           </a:bodyPr>
           <a:p>
-            <a:endParaRPr b="0" lang="en-US" sz="2800" spc="-1" strike="noStrike">
-              <a:solidFill>
-                <a:srgbClr val="000000"/>
-              </a:solidFill>
+            <a:endParaRPr b="0" lang="en-US" sz="3200" spc="-1" strike="noStrike">
               <a:latin typeface="Arial"/>
             </a:endParaRPr>
           </a:p>
@@ -1119,10 +1059,7 @@
             <a:normAutofit/>
           </a:bodyPr>
           <a:p>
-            <a:endParaRPr b="0" lang="en-US" sz="2800" spc="-1" strike="noStrike">
-              <a:solidFill>
-                <a:srgbClr val="000000"/>
-              </a:solidFill>
+            <a:endParaRPr b="0" lang="en-US" sz="3200" spc="-1" strike="noStrike">
               <a:latin typeface="Arial"/>
             </a:endParaRPr>
           </a:p>
@@ -1152,10 +1089,7 @@
             <a:normAutofit/>
           </a:bodyPr>
           <a:p>
-            <a:endParaRPr b="0" lang="en-US" sz="2800" spc="-1" strike="noStrike">
-              <a:solidFill>
-                <a:srgbClr val="000000"/>
-              </a:solidFill>
+            <a:endParaRPr b="0" lang="en-US" sz="3200" spc="-1" strike="noStrike">
               <a:latin typeface="Arial"/>
             </a:endParaRPr>
           </a:p>
@@ -1205,10 +1139,8 @@
         <p:txBody>
           <a:bodyPr lIns="0" rIns="0" tIns="0" bIns="0" anchor="ctr"/>
           <a:p>
-            <a:endParaRPr b="0" lang="en-US" sz="1800" spc="-1" strike="noStrike">
-              <a:solidFill>
-                <a:srgbClr val="000000"/>
-              </a:solidFill>
+            <a:pPr algn="ctr"/>
+            <a:endParaRPr b="0" lang="en-US" sz="4400" spc="-1" strike="noStrike">
               <a:latin typeface="Arial"/>
             </a:endParaRPr>
           </a:p>
@@ -1287,10 +1219,8 @@
         <p:txBody>
           <a:bodyPr lIns="0" rIns="0" tIns="0" bIns="0" anchor="ctr"/>
           <a:p>
-            <a:endParaRPr b="0" lang="en-US" sz="1800" spc="-1" strike="noStrike">
-              <a:solidFill>
-                <a:srgbClr val="000000"/>
-              </a:solidFill>
+            <a:pPr algn="ctr"/>
+            <a:endParaRPr b="0" lang="en-US" sz="4400" spc="-1" strike="noStrike">
               <a:latin typeface="Arial"/>
             </a:endParaRPr>
           </a:p>
@@ -1320,10 +1250,7 @@
             <a:normAutofit/>
           </a:bodyPr>
           <a:p>
-            <a:endParaRPr b="0" lang="en-US" sz="2800" spc="-1" strike="noStrike">
-              <a:solidFill>
-                <a:srgbClr val="000000"/>
-              </a:solidFill>
+            <a:endParaRPr b="0" lang="en-US" sz="3200" spc="-1" strike="noStrike">
               <a:latin typeface="Arial"/>
             </a:endParaRPr>
           </a:p>
@@ -1353,10 +1280,7 @@
             <a:normAutofit/>
           </a:bodyPr>
           <a:p>
-            <a:endParaRPr b="0" lang="en-US" sz="2800" spc="-1" strike="noStrike">
-              <a:solidFill>
-                <a:srgbClr val="000000"/>
-              </a:solidFill>
+            <a:endParaRPr b="0" lang="en-US" sz="3200" spc="-1" strike="noStrike">
               <a:latin typeface="Arial"/>
             </a:endParaRPr>
           </a:p>
@@ -1386,10 +1310,7 @@
             <a:normAutofit/>
           </a:bodyPr>
           <a:p>
-            <a:endParaRPr b="0" lang="en-US" sz="2800" spc="-1" strike="noStrike">
-              <a:solidFill>
-                <a:srgbClr val="000000"/>
-              </a:solidFill>
+            <a:endParaRPr b="0" lang="en-US" sz="3200" spc="-1" strike="noStrike">
               <a:latin typeface="Arial"/>
             </a:endParaRPr>
           </a:p>
@@ -1439,10 +1360,8 @@
         <p:txBody>
           <a:bodyPr lIns="0" rIns="0" tIns="0" bIns="0" anchor="ctr"/>
           <a:p>
-            <a:endParaRPr b="0" lang="en-US" sz="1800" spc="-1" strike="noStrike">
-              <a:solidFill>
-                <a:srgbClr val="000000"/>
-              </a:solidFill>
+            <a:pPr algn="ctr"/>
+            <a:endParaRPr b="0" lang="en-US" sz="4400" spc="-1" strike="noStrike">
               <a:latin typeface="Arial"/>
             </a:endParaRPr>
           </a:p>
@@ -1472,10 +1391,7 @@
             <a:normAutofit/>
           </a:bodyPr>
           <a:p>
-            <a:endParaRPr b="0" lang="en-US" sz="2800" spc="-1" strike="noStrike">
-              <a:solidFill>
-                <a:srgbClr val="000000"/>
-              </a:solidFill>
+            <a:endParaRPr b="0" lang="en-US" sz="3200" spc="-1" strike="noStrike">
               <a:latin typeface="Arial"/>
             </a:endParaRPr>
           </a:p>
@@ -1505,10 +1421,7 @@
             <a:normAutofit/>
           </a:bodyPr>
           <a:p>
-            <a:endParaRPr b="0" lang="en-US" sz="2800" spc="-1" strike="noStrike">
-              <a:solidFill>
-                <a:srgbClr val="000000"/>
-              </a:solidFill>
+            <a:endParaRPr b="0" lang="en-US" sz="3200" spc="-1" strike="noStrike">
               <a:latin typeface="Arial"/>
             </a:endParaRPr>
           </a:p>
@@ -1538,10 +1451,7 @@
             <a:normAutofit/>
           </a:bodyPr>
           <a:p>
-            <a:endParaRPr b="0" lang="en-US" sz="2800" spc="-1" strike="noStrike">
-              <a:solidFill>
-                <a:srgbClr val="000000"/>
-              </a:solidFill>
+            <a:endParaRPr b="0" lang="en-US" sz="3200" spc="-1" strike="noStrike">
               <a:latin typeface="Arial"/>
             </a:endParaRPr>
           </a:p>
@@ -1591,10 +1501,8 @@
         <p:txBody>
           <a:bodyPr lIns="0" rIns="0" tIns="0" bIns="0" anchor="ctr"/>
           <a:p>
-            <a:endParaRPr b="0" lang="en-US" sz="1800" spc="-1" strike="noStrike">
-              <a:solidFill>
-                <a:srgbClr val="000000"/>
-              </a:solidFill>
+            <a:pPr algn="ctr"/>
+            <a:endParaRPr b="0" lang="en-US" sz="4400" spc="-1" strike="noStrike">
               <a:latin typeface="Arial"/>
             </a:endParaRPr>
           </a:p>
@@ -1624,10 +1532,7 @@
             <a:normAutofit/>
           </a:bodyPr>
           <a:p>
-            <a:endParaRPr b="0" lang="en-US" sz="2800" spc="-1" strike="noStrike">
-              <a:solidFill>
-                <a:srgbClr val="000000"/>
-              </a:solidFill>
+            <a:endParaRPr b="0" lang="en-US" sz="3200" spc="-1" strike="noStrike">
               <a:latin typeface="Arial"/>
             </a:endParaRPr>
           </a:p>
@@ -1657,10 +1562,7 @@
             <a:normAutofit/>
           </a:bodyPr>
           <a:p>
-            <a:endParaRPr b="0" lang="en-US" sz="2800" spc="-1" strike="noStrike">
-              <a:solidFill>
-                <a:srgbClr val="000000"/>
-              </a:solidFill>
+            <a:endParaRPr b="0" lang="en-US" sz="3200" spc="-1" strike="noStrike">
               <a:latin typeface="Arial"/>
             </a:endParaRPr>
           </a:p>
@@ -1710,10 +1612,8 @@
         <p:txBody>
           <a:bodyPr lIns="0" rIns="0" tIns="0" bIns="0" anchor="ctr"/>
           <a:p>
-            <a:endParaRPr b="0" lang="en-US" sz="1800" spc="-1" strike="noStrike">
-              <a:solidFill>
-                <a:srgbClr val="000000"/>
-              </a:solidFill>
+            <a:pPr algn="ctr"/>
+            <a:endParaRPr b="0" lang="en-US" sz="4400" spc="-1" strike="noStrike">
               <a:latin typeface="Arial"/>
             </a:endParaRPr>
           </a:p>
@@ -1743,10 +1643,7 @@
             <a:normAutofit/>
           </a:bodyPr>
           <a:p>
-            <a:endParaRPr b="0" lang="en-US" sz="2800" spc="-1" strike="noStrike">
-              <a:solidFill>
-                <a:srgbClr val="000000"/>
-              </a:solidFill>
+            <a:endParaRPr b="0" lang="en-US" sz="3200" spc="-1" strike="noStrike">
               <a:latin typeface="Arial"/>
             </a:endParaRPr>
           </a:p>
@@ -1776,10 +1673,7 @@
             <a:normAutofit/>
           </a:bodyPr>
           <a:p>
-            <a:endParaRPr b="0" lang="en-US" sz="2800" spc="-1" strike="noStrike">
-              <a:solidFill>
-                <a:srgbClr val="000000"/>
-              </a:solidFill>
+            <a:endParaRPr b="0" lang="en-US" sz="3200" spc="-1" strike="noStrike">
               <a:latin typeface="Arial"/>
             </a:endParaRPr>
           </a:p>
@@ -1809,10 +1703,7 @@
             <a:normAutofit/>
           </a:bodyPr>
           <a:p>
-            <a:endParaRPr b="0" lang="en-US" sz="2800" spc="-1" strike="noStrike">
-              <a:solidFill>
-                <a:srgbClr val="000000"/>
-              </a:solidFill>
+            <a:endParaRPr b="0" lang="en-US" sz="3200" spc="-1" strike="noStrike">
               <a:latin typeface="Arial"/>
             </a:endParaRPr>
           </a:p>
@@ -1842,10 +1733,7 @@
             <a:normAutofit/>
           </a:bodyPr>
           <a:p>
-            <a:endParaRPr b="0" lang="en-US" sz="2800" spc="-1" strike="noStrike">
-              <a:solidFill>
-                <a:srgbClr val="000000"/>
-              </a:solidFill>
+            <a:endParaRPr b="0" lang="en-US" sz="3200" spc="-1" strike="noStrike">
               <a:latin typeface="Arial"/>
             </a:endParaRPr>
           </a:p>
@@ -1895,10 +1783,8 @@
         <p:txBody>
           <a:bodyPr lIns="0" rIns="0" tIns="0" bIns="0" anchor="ctr"/>
           <a:p>
-            <a:endParaRPr b="0" lang="en-US" sz="1800" spc="-1" strike="noStrike">
-              <a:solidFill>
-                <a:srgbClr val="000000"/>
-              </a:solidFill>
+            <a:pPr algn="ctr"/>
+            <a:endParaRPr b="0" lang="en-US" sz="4400" spc="-1" strike="noStrike">
               <a:latin typeface="Arial"/>
             </a:endParaRPr>
           </a:p>
@@ -1928,10 +1814,7 @@
             <a:normAutofit/>
           </a:bodyPr>
           <a:p>
-            <a:endParaRPr b="0" lang="en-US" sz="2800" spc="-1" strike="noStrike">
-              <a:solidFill>
-                <a:srgbClr val="000000"/>
-              </a:solidFill>
+            <a:endParaRPr b="0" lang="en-US" sz="3200" spc="-1" strike="noStrike">
               <a:latin typeface="Arial"/>
             </a:endParaRPr>
           </a:p>
@@ -1961,10 +1844,7 @@
             <a:normAutofit/>
           </a:bodyPr>
           <a:p>
-            <a:endParaRPr b="0" lang="en-US" sz="2800" spc="-1" strike="noStrike">
-              <a:solidFill>
-                <a:srgbClr val="000000"/>
-              </a:solidFill>
+            <a:endParaRPr b="0" lang="en-US" sz="3200" spc="-1" strike="noStrike">
               <a:latin typeface="Arial"/>
             </a:endParaRPr>
           </a:p>
@@ -1994,10 +1874,7 @@
             <a:normAutofit/>
           </a:bodyPr>
           <a:p>
-            <a:endParaRPr b="0" lang="en-US" sz="2800" spc="-1" strike="noStrike">
-              <a:solidFill>
-                <a:srgbClr val="000000"/>
-              </a:solidFill>
+            <a:endParaRPr b="0" lang="en-US" sz="3200" spc="-1" strike="noStrike">
               <a:latin typeface="Arial"/>
             </a:endParaRPr>
           </a:p>
@@ -2027,10 +1904,7 @@
             <a:normAutofit/>
           </a:bodyPr>
           <a:p>
-            <a:endParaRPr b="0" lang="en-US" sz="2800" spc="-1" strike="noStrike">
-              <a:solidFill>
-                <a:srgbClr val="000000"/>
-              </a:solidFill>
+            <a:endParaRPr b="0" lang="en-US" sz="3200" spc="-1" strike="noStrike">
               <a:latin typeface="Arial"/>
             </a:endParaRPr>
           </a:p>
@@ -2060,10 +1934,7 @@
             <a:normAutofit/>
           </a:bodyPr>
           <a:p>
-            <a:endParaRPr b="0" lang="en-US" sz="2800" spc="-1" strike="noStrike">
-              <a:solidFill>
-                <a:srgbClr val="000000"/>
-              </a:solidFill>
+            <a:endParaRPr b="0" lang="en-US" sz="3200" spc="-1" strike="noStrike">
               <a:latin typeface="Arial"/>
             </a:endParaRPr>
           </a:p>
@@ -2093,10 +1964,7 @@
             <a:normAutofit/>
           </a:bodyPr>
           <a:p>
-            <a:endParaRPr b="0" lang="en-US" sz="2800" spc="-1" strike="noStrike">
-              <a:solidFill>
-                <a:srgbClr val="000000"/>
-              </a:solidFill>
+            <a:endParaRPr b="0" lang="en-US" sz="3200" spc="-1" strike="noStrike">
               <a:latin typeface="Arial"/>
             </a:endParaRPr>
           </a:p>
@@ -2146,10 +2014,8 @@
         <p:txBody>
           <a:bodyPr lIns="0" rIns="0" tIns="0" bIns="0" anchor="ctr"/>
           <a:p>
-            <a:endParaRPr b="0" lang="en-US" sz="1800" spc="-1" strike="noStrike">
-              <a:solidFill>
-                <a:srgbClr val="000000"/>
-              </a:solidFill>
+            <a:pPr algn="ctr"/>
+            <a:endParaRPr b="0" lang="en-US" sz="4400" spc="-1" strike="noStrike">
               <a:latin typeface="Arial"/>
             </a:endParaRPr>
           </a:p>
@@ -2179,10 +2045,7 @@
             <a:normAutofit/>
           </a:bodyPr>
           <a:p>
-            <a:endParaRPr b="0" lang="en-US" sz="2800" spc="-1" strike="noStrike">
-              <a:solidFill>
-                <a:srgbClr val="000000"/>
-              </a:solidFill>
+            <a:endParaRPr b="0" lang="en-US" sz="3200" spc="-1" strike="noStrike">
               <a:latin typeface="Arial"/>
             </a:endParaRPr>
           </a:p>
@@ -2232,10 +2095,8 @@
         <p:txBody>
           <a:bodyPr lIns="0" rIns="0" tIns="0" bIns="0" anchor="ctr"/>
           <a:p>
-            <a:endParaRPr b="0" lang="en-US" sz="1800" spc="-1" strike="noStrike">
-              <a:solidFill>
-                <a:srgbClr val="000000"/>
-              </a:solidFill>
+            <a:pPr algn="ctr"/>
+            <a:endParaRPr b="0" lang="en-US" sz="4400" spc="-1" strike="noStrike">
               <a:latin typeface="Arial"/>
             </a:endParaRPr>
           </a:p>
@@ -2265,10 +2126,7 @@
             <a:normAutofit/>
           </a:bodyPr>
           <a:p>
-            <a:endParaRPr b="0" lang="en-US" sz="2800" spc="-1" strike="noStrike">
-              <a:solidFill>
-                <a:srgbClr val="000000"/>
-              </a:solidFill>
+            <a:endParaRPr b="0" lang="en-US" sz="3200" spc="-1" strike="noStrike">
               <a:latin typeface="Arial"/>
             </a:endParaRPr>
           </a:p>
@@ -2298,10 +2156,7 @@
             <a:normAutofit/>
           </a:bodyPr>
           <a:p>
-            <a:endParaRPr b="0" lang="en-US" sz="2800" spc="-1" strike="noStrike">
-              <a:solidFill>
-                <a:srgbClr val="000000"/>
-              </a:solidFill>
+            <a:endParaRPr b="0" lang="en-US" sz="3200" spc="-1" strike="noStrike">
               <a:latin typeface="Arial"/>
             </a:endParaRPr>
           </a:p>
@@ -2351,10 +2206,8 @@
         <p:txBody>
           <a:bodyPr lIns="0" rIns="0" tIns="0" bIns="0" anchor="ctr"/>
           <a:p>
-            <a:endParaRPr b="0" lang="en-US" sz="1800" spc="-1" strike="noStrike">
-              <a:solidFill>
-                <a:srgbClr val="000000"/>
-              </a:solidFill>
+            <a:pPr algn="ctr"/>
+            <a:endParaRPr b="0" lang="en-US" sz="4400" spc="-1" strike="noStrike">
               <a:latin typeface="Arial"/>
             </a:endParaRPr>
           </a:p>
@@ -2455,10 +2308,8 @@
         <p:txBody>
           <a:bodyPr lIns="0" rIns="0" tIns="0" bIns="0" anchor="ctr"/>
           <a:p>
-            <a:endParaRPr b="0" lang="en-US" sz="1800" spc="-1" strike="noStrike">
-              <a:solidFill>
-                <a:srgbClr val="000000"/>
-              </a:solidFill>
+            <a:pPr algn="ctr"/>
+            <a:endParaRPr b="0" lang="en-US" sz="4400" spc="-1" strike="noStrike">
               <a:latin typeface="Arial"/>
             </a:endParaRPr>
           </a:p>
@@ -2488,10 +2339,7 @@
             <a:normAutofit/>
           </a:bodyPr>
           <a:p>
-            <a:endParaRPr b="0" lang="en-US" sz="2800" spc="-1" strike="noStrike">
-              <a:solidFill>
-                <a:srgbClr val="000000"/>
-              </a:solidFill>
+            <a:endParaRPr b="0" lang="en-US" sz="3200" spc="-1" strike="noStrike">
               <a:latin typeface="Arial"/>
             </a:endParaRPr>
           </a:p>
@@ -2521,10 +2369,7 @@
             <a:normAutofit/>
           </a:bodyPr>
           <a:p>
-            <a:endParaRPr b="0" lang="en-US" sz="2800" spc="-1" strike="noStrike">
-              <a:solidFill>
-                <a:srgbClr val="000000"/>
-              </a:solidFill>
+            <a:endParaRPr b="0" lang="en-US" sz="3200" spc="-1" strike="noStrike">
               <a:latin typeface="Arial"/>
             </a:endParaRPr>
           </a:p>
@@ -2554,10 +2399,7 @@
             <a:normAutofit/>
           </a:bodyPr>
           <a:p>
-            <a:endParaRPr b="0" lang="en-US" sz="2800" spc="-1" strike="noStrike">
-              <a:solidFill>
-                <a:srgbClr val="000000"/>
-              </a:solidFill>
+            <a:endParaRPr b="0" lang="en-US" sz="3200" spc="-1" strike="noStrike">
               <a:latin typeface="Arial"/>
             </a:endParaRPr>
           </a:p>
@@ -2607,10 +2449,8 @@
         <p:txBody>
           <a:bodyPr lIns="0" rIns="0" tIns="0" bIns="0" anchor="ctr"/>
           <a:p>
-            <a:endParaRPr b="0" lang="en-US" sz="1800" spc="-1" strike="noStrike">
-              <a:solidFill>
-                <a:srgbClr val="000000"/>
-              </a:solidFill>
+            <a:pPr algn="ctr"/>
+            <a:endParaRPr b="0" lang="en-US" sz="4400" spc="-1" strike="noStrike">
               <a:latin typeface="Arial"/>
             </a:endParaRPr>
           </a:p>
@@ -2640,10 +2480,7 @@
             <a:normAutofit/>
           </a:bodyPr>
           <a:p>
-            <a:endParaRPr b="0" lang="en-US" sz="2800" spc="-1" strike="noStrike">
-              <a:solidFill>
-                <a:srgbClr val="000000"/>
-              </a:solidFill>
+            <a:endParaRPr b="0" lang="en-US" sz="3200" spc="-1" strike="noStrike">
               <a:latin typeface="Arial"/>
             </a:endParaRPr>
           </a:p>
@@ -2673,10 +2510,7 @@
             <a:normAutofit/>
           </a:bodyPr>
           <a:p>
-            <a:endParaRPr b="0" lang="en-US" sz="2800" spc="-1" strike="noStrike">
-              <a:solidFill>
-                <a:srgbClr val="000000"/>
-              </a:solidFill>
+            <a:endParaRPr b="0" lang="en-US" sz="3200" spc="-1" strike="noStrike">
               <a:latin typeface="Arial"/>
             </a:endParaRPr>
           </a:p>
@@ -2706,10 +2540,7 @@
             <a:normAutofit/>
           </a:bodyPr>
           <a:p>
-            <a:endParaRPr b="0" lang="en-US" sz="2800" spc="-1" strike="noStrike">
-              <a:solidFill>
-                <a:srgbClr val="000000"/>
-              </a:solidFill>
+            <a:endParaRPr b="0" lang="en-US" sz="3200" spc="-1" strike="noStrike">
               <a:latin typeface="Arial"/>
             </a:endParaRPr>
           </a:p>
@@ -2759,10 +2590,8 @@
         <p:txBody>
           <a:bodyPr lIns="0" rIns="0" tIns="0" bIns="0" anchor="ctr"/>
           <a:p>
-            <a:endParaRPr b="0" lang="en-US" sz="1800" spc="-1" strike="noStrike">
-              <a:solidFill>
-                <a:srgbClr val="000000"/>
-              </a:solidFill>
+            <a:pPr algn="ctr"/>
+            <a:endParaRPr b="0" lang="en-US" sz="4400" spc="-1" strike="noStrike">
               <a:latin typeface="Arial"/>
             </a:endParaRPr>
           </a:p>
@@ -2792,10 +2621,7 @@
             <a:normAutofit/>
           </a:bodyPr>
           <a:p>
-            <a:endParaRPr b="0" lang="en-US" sz="2800" spc="-1" strike="noStrike">
-              <a:solidFill>
-                <a:srgbClr val="000000"/>
-              </a:solidFill>
+            <a:endParaRPr b="0" lang="en-US" sz="3200" spc="-1" strike="noStrike">
               <a:latin typeface="Arial"/>
             </a:endParaRPr>
           </a:p>
@@ -2825,10 +2651,7 @@
             <a:normAutofit/>
           </a:bodyPr>
           <a:p>
-            <a:endParaRPr b="0" lang="en-US" sz="2800" spc="-1" strike="noStrike">
-              <a:solidFill>
-                <a:srgbClr val="000000"/>
-              </a:solidFill>
+            <a:endParaRPr b="0" lang="en-US" sz="3200" spc="-1" strike="noStrike">
               <a:latin typeface="Arial"/>
             </a:endParaRPr>
           </a:p>
@@ -2858,10 +2681,7 @@
             <a:normAutofit/>
           </a:bodyPr>
           <a:p>
-            <a:endParaRPr b="0" lang="en-US" sz="2800" spc="-1" strike="noStrike">
-              <a:solidFill>
-                <a:srgbClr val="000000"/>
-              </a:solidFill>
+            <a:endParaRPr b="0" lang="en-US" sz="3200" spc="-1" strike="noStrike">
               <a:latin typeface="Arial"/>
             </a:endParaRPr>
           </a:p>
@@ -2911,8 +2731,8 @@
         </p:nvSpPr>
         <p:spPr>
           <a:xfrm>
-            <a:off x="488880" y="2160"/>
-            <a:ext cx="8025840" cy="1145160"/>
+            <a:off x="457200" y="273600"/>
+            <a:ext cx="8229240" cy="1144800"/>
           </a:xfrm>
           <a:prstGeom prst="rect">
             <a:avLst/>
@@ -2921,19 +2741,14 @@
         <p:txBody>
           <a:bodyPr lIns="0" rIns="0" tIns="0" bIns="0" anchor="ctr"/>
           <a:p>
+            <a:pPr algn="ctr"/>
             <a:r>
               <a:rPr b="0" lang="en-US" sz="4400" spc="-1" strike="noStrike">
-                <a:solidFill>
-                  <a:srgbClr val="000000"/>
-                </a:solidFill>
                 <a:latin typeface="Arial"/>
               </a:rPr>
               <a:t>Click to edit the title text format</a:t>
             </a:r>
             <a:endParaRPr b="0" lang="en-US" sz="4400" spc="-1" strike="noStrike">
-              <a:solidFill>
-                <a:srgbClr val="000000"/>
-              </a:solidFill>
               <a:latin typeface="Arial"/>
             </a:endParaRPr>
           </a:p>
@@ -2975,18 +2790,12 @@
               <a:buChar char=""/>
             </a:pPr>
             <a:r>
-              <a:rPr b="0" lang="en-US" sz="2800" spc="-1" strike="noStrike">
-                <a:solidFill>
-                  <a:srgbClr val="000000"/>
-                </a:solidFill>
+              <a:rPr b="0" lang="en-US" sz="3200" spc="-1" strike="noStrike">
                 <a:latin typeface="Arial"/>
               </a:rPr>
               <a:t>Click to edit the outline text format</a:t>
             </a:r>
-            <a:endParaRPr b="0" lang="en-US" sz="2800" spc="-1" strike="noStrike">
-              <a:solidFill>
-                <a:srgbClr val="000000"/>
-              </a:solidFill>
+            <a:endParaRPr b="0" lang="en-US" sz="3200" spc="-1" strike="noStrike">
               <a:latin typeface="Arial"/>
             </a:endParaRPr>
           </a:p>
@@ -3003,18 +2812,12 @@
               <a:buChar char=""/>
             </a:pPr>
             <a:r>
-              <a:rPr b="0" lang="en-US" sz="2000" spc="-1" strike="noStrike">
-                <a:solidFill>
-                  <a:srgbClr val="000000"/>
-                </a:solidFill>
+              <a:rPr b="0" lang="en-US" sz="2800" spc="-1" strike="noStrike">
                 <a:latin typeface="Arial"/>
               </a:rPr>
               <a:t>Second Outline Level</a:t>
             </a:r>
-            <a:endParaRPr b="0" lang="en-US" sz="2000" spc="-1" strike="noStrike">
-              <a:solidFill>
-                <a:srgbClr val="000000"/>
-              </a:solidFill>
+            <a:endParaRPr b="0" lang="en-US" sz="2800" spc="-1" strike="noStrike">
               <a:latin typeface="Arial"/>
             </a:endParaRPr>
           </a:p>
@@ -3031,18 +2834,12 @@
               <a:buChar char=""/>
             </a:pPr>
             <a:r>
-              <a:rPr b="0" lang="en-US" sz="1800" spc="-1" strike="noStrike">
-                <a:solidFill>
-                  <a:srgbClr val="000000"/>
-                </a:solidFill>
+              <a:rPr b="0" lang="en-US" sz="2400" spc="-1" strike="noStrike">
                 <a:latin typeface="Arial"/>
               </a:rPr>
               <a:t>Third Outline Level</a:t>
             </a:r>
-            <a:endParaRPr b="0" lang="en-US" sz="1800" spc="-1" strike="noStrike">
-              <a:solidFill>
-                <a:srgbClr val="000000"/>
-              </a:solidFill>
+            <a:endParaRPr b="0" lang="en-US" sz="2400" spc="-1" strike="noStrike">
               <a:latin typeface="Arial"/>
             </a:endParaRPr>
           </a:p>
@@ -3059,18 +2856,12 @@
               <a:buChar char=""/>
             </a:pPr>
             <a:r>
-              <a:rPr b="0" lang="en-US" sz="1800" spc="-1" strike="noStrike">
-                <a:solidFill>
-                  <a:srgbClr val="000000"/>
-                </a:solidFill>
+              <a:rPr b="0" lang="en-US" sz="2000" spc="-1" strike="noStrike">
                 <a:latin typeface="Arial"/>
               </a:rPr>
               <a:t>Fourth Outline Level</a:t>
             </a:r>
-            <a:endParaRPr b="0" lang="en-US" sz="1800" spc="-1" strike="noStrike">
-              <a:solidFill>
-                <a:srgbClr val="000000"/>
-              </a:solidFill>
+            <a:endParaRPr b="0" lang="en-US" sz="2000" spc="-1" strike="noStrike">
               <a:latin typeface="Arial"/>
             </a:endParaRPr>
           </a:p>
@@ -3088,17 +2879,11 @@
             </a:pPr>
             <a:r>
               <a:rPr b="0" lang="en-US" sz="2000" spc="-1" strike="noStrike">
-                <a:solidFill>
-                  <a:srgbClr val="000000"/>
-                </a:solidFill>
                 <a:latin typeface="Arial"/>
               </a:rPr>
               <a:t>Fifth Outline Level</a:t>
             </a:r>
             <a:endParaRPr b="0" lang="en-US" sz="2000" spc="-1" strike="noStrike">
-              <a:solidFill>
-                <a:srgbClr val="000000"/>
-              </a:solidFill>
               <a:latin typeface="Arial"/>
             </a:endParaRPr>
           </a:p>
@@ -3116,17 +2901,11 @@
             </a:pPr>
             <a:r>
               <a:rPr b="0" lang="en-US" sz="2000" spc="-1" strike="noStrike">
-                <a:solidFill>
-                  <a:srgbClr val="000000"/>
-                </a:solidFill>
                 <a:latin typeface="Arial"/>
               </a:rPr>
               <a:t>Sixth Outline Level</a:t>
             </a:r>
             <a:endParaRPr b="0" lang="en-US" sz="2000" spc="-1" strike="noStrike">
-              <a:solidFill>
-                <a:srgbClr val="000000"/>
-              </a:solidFill>
               <a:latin typeface="Arial"/>
             </a:endParaRPr>
           </a:p>
@@ -3144,17 +2923,11 @@
             </a:pPr>
             <a:r>
               <a:rPr b="0" lang="en-US" sz="2000" spc="-1" strike="noStrike">
-                <a:solidFill>
-                  <a:srgbClr val="000000"/>
-                </a:solidFill>
                 <a:latin typeface="Arial"/>
               </a:rPr>
               <a:t>Seventh Outline Level</a:t>
             </a:r>
             <a:endParaRPr b="0" lang="en-US" sz="2000" spc="-1" strike="noStrike">
-              <a:solidFill>
-                <a:srgbClr val="000000"/>
-              </a:solidFill>
               <a:latin typeface="Arial"/>
             </a:endParaRPr>
           </a:p>
@@ -3229,19 +3002,14 @@
         <p:txBody>
           <a:bodyPr lIns="0" rIns="0" tIns="0" bIns="0" anchor="ctr"/>
           <a:p>
-            <a:r>
-              <a:rPr b="0" lang="en-US" sz="1800" spc="-1" strike="noStrike">
-                <a:solidFill>
-                  <a:srgbClr val="000000"/>
-                </a:solidFill>
+            <a:pPr algn="ctr"/>
+            <a:r>
+              <a:rPr b="0" lang="en-US" sz="4400" spc="-1" strike="noStrike">
                 <a:latin typeface="Arial"/>
               </a:rPr>
               <a:t>Click to edit the title text format</a:t>
             </a:r>
-            <a:endParaRPr b="0" lang="en-US" sz="1800" spc="-1" strike="noStrike">
-              <a:solidFill>
-                <a:srgbClr val="000000"/>
-              </a:solidFill>
+            <a:endParaRPr b="0" lang="en-US" sz="4400" spc="-1" strike="noStrike">
               <a:latin typeface="Arial"/>
             </a:endParaRPr>
           </a:p>
@@ -3283,18 +3051,12 @@
               <a:buChar char=""/>
             </a:pPr>
             <a:r>
-              <a:rPr b="0" lang="en-US" sz="2800" spc="-1" strike="noStrike">
-                <a:solidFill>
-                  <a:srgbClr val="000000"/>
-                </a:solidFill>
+              <a:rPr b="0" lang="en-US" sz="3200" spc="-1" strike="noStrike">
                 <a:latin typeface="Arial"/>
               </a:rPr>
               <a:t>Click to edit the outline text format</a:t>
             </a:r>
-            <a:endParaRPr b="0" lang="en-US" sz="2800" spc="-1" strike="noStrike">
-              <a:solidFill>
-                <a:srgbClr val="000000"/>
-              </a:solidFill>
+            <a:endParaRPr b="0" lang="en-US" sz="3200" spc="-1" strike="noStrike">
               <a:latin typeface="Arial"/>
             </a:endParaRPr>
           </a:p>
@@ -3311,18 +3073,12 @@
               <a:buChar char=""/>
             </a:pPr>
             <a:r>
-              <a:rPr b="0" lang="en-US" sz="2000" spc="-1" strike="noStrike">
-                <a:solidFill>
-                  <a:srgbClr val="000000"/>
-                </a:solidFill>
+              <a:rPr b="0" lang="en-US" sz="2800" spc="-1" strike="noStrike">
                 <a:latin typeface="Arial"/>
               </a:rPr>
               <a:t>Second Outline Level</a:t>
             </a:r>
-            <a:endParaRPr b="0" lang="en-US" sz="2000" spc="-1" strike="noStrike">
-              <a:solidFill>
-                <a:srgbClr val="000000"/>
-              </a:solidFill>
+            <a:endParaRPr b="0" lang="en-US" sz="2800" spc="-1" strike="noStrike">
               <a:latin typeface="Arial"/>
             </a:endParaRPr>
           </a:p>
@@ -3339,18 +3095,12 @@
               <a:buChar char=""/>
             </a:pPr>
             <a:r>
-              <a:rPr b="0" lang="en-US" sz="1800" spc="-1" strike="noStrike">
-                <a:solidFill>
-                  <a:srgbClr val="000000"/>
-                </a:solidFill>
+              <a:rPr b="0" lang="en-US" sz="2400" spc="-1" strike="noStrike">
                 <a:latin typeface="Arial"/>
               </a:rPr>
               <a:t>Third Outline Level</a:t>
             </a:r>
-            <a:endParaRPr b="0" lang="en-US" sz="1800" spc="-1" strike="noStrike">
-              <a:solidFill>
-                <a:srgbClr val="000000"/>
-              </a:solidFill>
+            <a:endParaRPr b="0" lang="en-US" sz="2400" spc="-1" strike="noStrike">
               <a:latin typeface="Arial"/>
             </a:endParaRPr>
           </a:p>
@@ -3367,18 +3117,12 @@
               <a:buChar char=""/>
             </a:pPr>
             <a:r>
-              <a:rPr b="0" lang="en-US" sz="1800" spc="-1" strike="noStrike">
-                <a:solidFill>
-                  <a:srgbClr val="000000"/>
-                </a:solidFill>
+              <a:rPr b="0" lang="en-US" sz="2000" spc="-1" strike="noStrike">
                 <a:latin typeface="Arial"/>
               </a:rPr>
               <a:t>Fourth Outline Level</a:t>
             </a:r>
-            <a:endParaRPr b="0" lang="en-US" sz="1800" spc="-1" strike="noStrike">
-              <a:solidFill>
-                <a:srgbClr val="000000"/>
-              </a:solidFill>
+            <a:endParaRPr b="0" lang="en-US" sz="2000" spc="-1" strike="noStrike">
               <a:latin typeface="Arial"/>
             </a:endParaRPr>
           </a:p>
@@ -3396,17 +3140,11 @@
             </a:pPr>
             <a:r>
               <a:rPr b="0" lang="en-US" sz="2000" spc="-1" strike="noStrike">
-                <a:solidFill>
-                  <a:srgbClr val="000000"/>
-                </a:solidFill>
                 <a:latin typeface="Arial"/>
               </a:rPr>
               <a:t>Fifth Outline Level</a:t>
             </a:r>
             <a:endParaRPr b="0" lang="en-US" sz="2000" spc="-1" strike="noStrike">
-              <a:solidFill>
-                <a:srgbClr val="000000"/>
-              </a:solidFill>
               <a:latin typeface="Arial"/>
             </a:endParaRPr>
           </a:p>
@@ -3424,17 +3162,11 @@
             </a:pPr>
             <a:r>
               <a:rPr b="0" lang="en-US" sz="2000" spc="-1" strike="noStrike">
-                <a:solidFill>
-                  <a:srgbClr val="000000"/>
-                </a:solidFill>
                 <a:latin typeface="Arial"/>
               </a:rPr>
               <a:t>Sixth Outline Level</a:t>
             </a:r>
             <a:endParaRPr b="0" lang="en-US" sz="2000" spc="-1" strike="noStrike">
-              <a:solidFill>
-                <a:srgbClr val="000000"/>
-              </a:solidFill>
               <a:latin typeface="Arial"/>
             </a:endParaRPr>
           </a:p>
@@ -3452,17 +3184,11 @@
             </a:pPr>
             <a:r>
               <a:rPr b="0" lang="en-US" sz="2000" spc="-1" strike="noStrike">
-                <a:solidFill>
-                  <a:srgbClr val="000000"/>
-                </a:solidFill>
                 <a:latin typeface="Arial"/>
               </a:rPr>
               <a:t>Seventh Outline Level</a:t>
             </a:r>
             <a:endParaRPr b="0" lang="en-US" sz="2000" spc="-1" strike="noStrike">
-              <a:solidFill>
-                <a:srgbClr val="000000"/>
-              </a:solidFill>
               <a:latin typeface="Arial"/>
             </a:endParaRPr>
           </a:p>
@@ -3514,7 +3240,7 @@
         <p:spPr>
           <a:xfrm>
             <a:off x="1305720" y="657000"/>
-            <a:ext cx="6532200" cy="1428840"/>
+            <a:ext cx="6531480" cy="1428120"/>
           </a:xfrm>
           <a:prstGeom prst="rect">
             <a:avLst/>
@@ -3566,7 +3292,7 @@
         <p:spPr>
           <a:xfrm>
             <a:off x="727200" y="1735920"/>
-            <a:ext cx="7730280" cy="902520"/>
+            <a:ext cx="7729560" cy="901800"/>
           </a:xfrm>
           <a:prstGeom prst="rect">
             <a:avLst/>
@@ -3615,7 +3341,7 @@
         <p:spPr>
           <a:xfrm>
             <a:off x="1305720" y="2797920"/>
-            <a:ext cx="5652000" cy="651600"/>
+            <a:ext cx="5651280" cy="650880"/>
           </a:xfrm>
           <a:prstGeom prst="rect">
             <a:avLst/>
@@ -3641,7 +3367,7 @@
         <p:spPr>
           <a:xfrm>
             <a:off x="727200" y="3350880"/>
-            <a:ext cx="4607640" cy="651600"/>
+            <a:ext cx="4606920" cy="650880"/>
           </a:xfrm>
           <a:prstGeom prst="rect">
             <a:avLst/>
@@ -3700,7 +3426,7 @@
         <p:spPr>
           <a:xfrm>
             <a:off x="5164560" y="4556160"/>
-            <a:ext cx="4429440" cy="750600"/>
+            <a:ext cx="4428720" cy="749880"/>
           </a:xfrm>
           <a:prstGeom prst="rect">
             <a:avLst/>
@@ -3730,14 +3456,43 @@
             <a:r>
               <a:rPr b="0" lang="en-US" sz="2000" spc="-1" strike="noStrike">
                 <a:solidFill>
-                  <a:srgbClr val="000000"/>
+                  <a:srgbClr val="ffffff"/>
                 </a:solidFill>
                 <a:latin typeface="Arial"/>
                 <a:ea typeface="DejaVu Sans"/>
               </a:rPr>
+              <a:t>Nhóm G9:</a:t>
+            </a:r>
+            <a:endParaRPr b="0" lang="en-US" sz="2000" spc="-1" strike="noStrike">
+              <a:solidFill>
+                <a:srgbClr val="ffffff"/>
+              </a:solidFill>
+              <a:latin typeface="Arial"/>
+            </a:endParaRPr>
+          </a:p>
+          <a:p>
+            <a:pPr>
+              <a:lnSpc>
+                <a:spcPct val="100000"/>
+              </a:lnSpc>
+              <a:spcBef>
+                <a:spcPts val="400"/>
+              </a:spcBef>
+            </a:pPr>
+            <a:r>
+              <a:rPr b="0" lang="en-US" sz="2000" spc="-1" strike="noStrike">
+                <a:solidFill>
+                  <a:srgbClr val="ffffff"/>
+                </a:solidFill>
+                <a:latin typeface="Arial"/>
+                <a:ea typeface="DejaVu Sans"/>
+              </a:rPr>
               <a:t>Nguyễn Hữu Hải - 20151197               </a:t>
             </a:r>
             <a:endParaRPr b="0" lang="en-US" sz="2000" spc="-1" strike="noStrike">
+              <a:solidFill>
+                <a:srgbClr val="ffffff"/>
+              </a:solidFill>
               <a:latin typeface="Arial"/>
             </a:endParaRPr>
           </a:p>
@@ -3753,7 +3508,7 @@
             <a:r>
               <a:rPr b="0" lang="en-US" sz="2000" spc="-1" strike="noStrike">
                 <a:solidFill>
-                  <a:srgbClr val="000000"/>
+                  <a:srgbClr val="ffffff"/>
                 </a:solidFill>
                 <a:latin typeface="Arial"/>
                 <a:ea typeface="DejaVu Sans"/>
@@ -3761,6 +3516,9 @@
               <a:t>Phạm Ngọc Quang - 20152980</a:t>
             </a:r>
             <a:endParaRPr b="0" lang="en-US" sz="2000" spc="-1" strike="noStrike">
+              <a:solidFill>
+                <a:srgbClr val="ffffff"/>
+              </a:solidFill>
               <a:latin typeface="Arial"/>
             </a:endParaRPr>
           </a:p>
@@ -3817,14 +3575,14 @@
       </p:grpSpPr>
       <p:sp>
         <p:nvSpPr>
-          <p:cNvPr id="98" name="CustomShape 1"/>
+          <p:cNvPr id="97" name="CustomShape 1"/>
           <p:cNvSpPr/>
           <p:nvPr/>
         </p:nvSpPr>
         <p:spPr>
           <a:xfrm>
-            <a:off x="488880" y="-87480"/>
-            <a:ext cx="8025840" cy="1324800"/>
+            <a:off x="398880" y="-151560"/>
+            <a:ext cx="8025120" cy="1324080"/>
           </a:xfrm>
           <a:prstGeom prst="rect">
             <a:avLst/>
@@ -3840,17 +3598,40 @@
           <a:effectRef idx="0"/>
           <a:fontRef idx="minor"/>
         </p:style>
-      </p:sp>
-      <p:sp>
-        <p:nvSpPr>
-          <p:cNvPr id="99" name="CustomShape 2"/>
+        <p:txBody>
+          <a:bodyPr lIns="90000" rIns="90000" tIns="45000" bIns="45000" anchor="ctr"/>
+          <a:p>
+            <a:pPr>
+              <a:lnSpc>
+                <a:spcPct val="90000"/>
+              </a:lnSpc>
+            </a:pPr>
+            <a:r>
+              <a:rPr b="1" lang="en-US" sz="3600" spc="-1" strike="noStrike">
+                <a:solidFill>
+                  <a:srgbClr val="ffffff"/>
+                </a:solidFill>
+                <a:latin typeface="Calibri"/>
+                <a:ea typeface="DejaVu Sans"/>
+              </a:rPr>
+              <a:t>3. Genetic Algorithm</a:t>
+            </a:r>
+            <a:endParaRPr b="0" lang="en-US" sz="3600" spc="-1" strike="noStrike">
+              <a:latin typeface="Arial"/>
+            </a:endParaRPr>
+          </a:p>
+        </p:txBody>
+      </p:sp>
+      <p:sp>
+        <p:nvSpPr>
+          <p:cNvPr id="98" name="CustomShape 2"/>
           <p:cNvSpPr/>
           <p:nvPr/>
         </p:nvSpPr>
         <p:spPr>
           <a:xfrm>
-            <a:off x="488880" y="1346040"/>
-            <a:ext cx="8025840" cy="4901400"/>
+            <a:off x="398880" y="1269000"/>
+            <a:ext cx="8177040" cy="4834080"/>
           </a:xfrm>
           <a:prstGeom prst="rect">
             <a:avLst/>
@@ -3867,7 +3648,9 @@
           <a:fontRef idx="minor"/>
         </p:style>
         <p:txBody>
-          <a:bodyPr lIns="90000" rIns="90000" tIns="45000" bIns="45000"/>
+          <a:bodyPr lIns="90000" rIns="90000" tIns="45000" bIns="45000">
+            <a:normAutofit/>
+          </a:bodyPr>
           <a:p>
             <a:pPr>
               <a:lnSpc>
@@ -3878,16 +3661,16 @@
               </a:spcBef>
             </a:pPr>
             <a:r>
-              <a:rPr b="0" lang="en-US" sz="2400" spc="-1" strike="noStrike">
+              <a:rPr b="0" lang="en-US" sz="2800" spc="-1" strike="noStrike">
                 <a:solidFill>
                   <a:srgbClr val="404040"/>
                 </a:solidFill>
                 <a:latin typeface="Calibri"/>
                 <a:ea typeface="DejaVu Sans"/>
               </a:rPr>
-              <a:t>Các thuật toán di truyền:</a:t>
-            </a:r>
-            <a:endParaRPr b="0" lang="en-US" sz="2400" spc="-1" strike="noStrike">
+              <a:t>3.1. Khởi tạo</a:t>
+            </a:r>
+            <a:endParaRPr b="0" lang="en-US" sz="2800" spc="-1" strike="noStrike">
               <a:latin typeface="Arial"/>
             </a:endParaRPr>
           </a:p>
@@ -3900,17 +3683,35 @@
                 <a:spcPts val="751"/>
               </a:spcBef>
             </a:pPr>
-            <a:r>
-              <a:rPr b="0" lang="en-US" sz="2400" spc="-1" strike="noStrike">
+            <a:endParaRPr b="0" lang="en-US" sz="2800" spc="-1" strike="noStrike">
+              <a:latin typeface="Arial"/>
+            </a:endParaRPr>
+          </a:p>
+          <a:p>
+            <a:pPr marL="457200" indent="-456120">
+              <a:lnSpc>
+                <a:spcPct val="90000"/>
+              </a:lnSpc>
+              <a:spcBef>
+                <a:spcPts val="751"/>
+              </a:spcBef>
+              <a:buClr>
+                <a:srgbClr val="404040"/>
+              </a:buClr>
+              <a:buFont typeface="StarSymbol"/>
+              <a:buChar char="-"/>
+            </a:pPr>
+            <a:r>
+              <a:rPr b="0" lang="en-US" sz="2800" spc="-1" strike="noStrike">
                 <a:solidFill>
                   <a:srgbClr val="404040"/>
                 </a:solidFill>
                 <a:latin typeface="Calibri"/>
                 <a:ea typeface="DejaVu Sans"/>
               </a:rPr>
-              <a:t>Lai ghép: Chọn ra 2 cá thể trong số những cá thể của Population rồi cho lai ghép với nhau theo xác suất</a:t>
-            </a:r>
-            <a:endParaRPr b="0" lang="en-US" sz="2400" spc="-1" strike="noStrike">
+              <a:t>Duyệt qua các item rồi chọn bin đầu tiên thỏa mãn thỏa mãn các điều kiện về cận trên của tổng W, P, T, R trong tập binIndices của item đó</a:t>
+            </a:r>
+            <a:endParaRPr b="0" lang="en-US" sz="2800" spc="-1" strike="noStrike">
               <a:latin typeface="Arial"/>
             </a:endParaRPr>
           </a:p>
@@ -3923,92 +3724,7 @@
                 <a:spcPts val="751"/>
               </a:spcBef>
             </a:pPr>
-            <a:endParaRPr b="0" lang="en-US" sz="2400" spc="-1" strike="noStrike">
-              <a:latin typeface="Arial"/>
-            </a:endParaRPr>
-          </a:p>
-          <a:p>
-            <a:pPr>
-              <a:lnSpc>
-                <a:spcPct val="90000"/>
-              </a:lnSpc>
-              <a:spcBef>
-                <a:spcPts val="751"/>
-              </a:spcBef>
-            </a:pPr>
-            <a:r>
-              <a:rPr b="0" lang="en-US" sz="2400" spc="-1" strike="noStrike">
-                <a:solidFill>
-                  <a:srgbClr val="404040"/>
-                </a:solidFill>
-                <a:latin typeface="Calibri"/>
-                <a:ea typeface="DejaVu Sans"/>
-              </a:rPr>
-              <a:t>Đột biến: Chọn ra một cá thể rồi sau đó thay đổi một số điểm của cá thể này</a:t>
-            </a:r>
-            <a:endParaRPr b="0" lang="en-US" sz="2400" spc="-1" strike="noStrike">
-              <a:latin typeface="Arial"/>
-            </a:endParaRPr>
-          </a:p>
-          <a:p>
-            <a:pPr>
-              <a:lnSpc>
-                <a:spcPct val="90000"/>
-              </a:lnSpc>
-              <a:spcBef>
-                <a:spcPts val="751"/>
-              </a:spcBef>
-            </a:pPr>
-            <a:endParaRPr b="0" lang="en-US" sz="2400" spc="-1" strike="noStrike">
-              <a:latin typeface="Arial"/>
-            </a:endParaRPr>
-          </a:p>
-        </p:txBody>
-      </p:sp>
-      <p:sp>
-        <p:nvSpPr>
-          <p:cNvPr id="100" name="CustomShape 3"/>
-          <p:cNvSpPr/>
-          <p:nvPr/>
-        </p:nvSpPr>
-        <p:spPr>
-          <a:xfrm>
-            <a:off x="398880" y="-151560"/>
-            <a:ext cx="8025840" cy="1324800"/>
-          </a:xfrm>
-          <a:prstGeom prst="rect">
-            <a:avLst/>
-          </a:prstGeom>
-          <a:noFill/>
-          <a:ln>
-            <a:noFill/>
-          </a:ln>
-        </p:spPr>
-        <p:style>
-          <a:lnRef idx="0"/>
-          <a:fillRef idx="0"/>
-          <a:effectRef idx="0"/>
-          <a:fontRef idx="minor"/>
-        </p:style>
-        <p:txBody>
-          <a:bodyPr lIns="90000" rIns="90000" tIns="45000" bIns="45000" anchor="ctr"/>
-          <a:p>
-            <a:pPr>
-              <a:lnSpc>
-                <a:spcPct val="90000"/>
-              </a:lnSpc>
-            </a:pPr>
-            <a:r>
-              <a:rPr b="1" lang="en-US" sz="3600" spc="-1" strike="noStrike">
-                <a:solidFill>
-                  <a:srgbClr val="ffffff"/>
-                </a:solidFill>
-                <a:latin typeface="Calibri"/>
-                <a:ea typeface="DejaVu Sans"/>
-              </a:rPr>
-              <a:t>3. Genetic Algorithm</a:t>
-            </a:r>
-            <a:endParaRPr b="0" lang="en-US" sz="3600" spc="-1" strike="noStrike">
+            <a:endParaRPr b="0" lang="en-US" sz="2800" spc="-1" strike="noStrike">
               <a:latin typeface="Arial"/>
             </a:endParaRPr>
           </a:p>
@@ -4065,14 +3781,14 @@
       </p:grpSpPr>
       <p:sp>
         <p:nvSpPr>
-          <p:cNvPr id="101" name="CustomShape 1"/>
+          <p:cNvPr id="99" name="CustomShape 1"/>
           <p:cNvSpPr/>
           <p:nvPr/>
         </p:nvSpPr>
         <p:spPr>
           <a:xfrm>
-            <a:off x="488880" y="-87480"/>
-            <a:ext cx="8025840" cy="1324800"/>
+            <a:off x="334080" y="-186120"/>
+            <a:ext cx="8025120" cy="1324080"/>
           </a:xfrm>
           <a:prstGeom prst="rect">
             <a:avLst/>
@@ -4088,17 +3804,40 @@
           <a:effectRef idx="0"/>
           <a:fontRef idx="minor"/>
         </p:style>
-      </p:sp>
-      <p:sp>
-        <p:nvSpPr>
-          <p:cNvPr id="102" name="CustomShape 2"/>
+        <p:txBody>
+          <a:bodyPr lIns="90000" rIns="90000" tIns="45000" bIns="45000" anchor="ctr"/>
+          <a:p>
+            <a:pPr>
+              <a:lnSpc>
+                <a:spcPct val="90000"/>
+              </a:lnSpc>
+            </a:pPr>
+            <a:r>
+              <a:rPr b="1" lang="en-US" sz="3600" spc="-1" strike="noStrike">
+                <a:solidFill>
+                  <a:srgbClr val="ffffff"/>
+                </a:solidFill>
+                <a:latin typeface="Calibri"/>
+                <a:ea typeface="DejaVu Sans"/>
+              </a:rPr>
+              <a:t>3. Genetic Algorithm</a:t>
+            </a:r>
+            <a:endParaRPr b="0" lang="en-US" sz="3600" spc="-1" strike="noStrike">
+              <a:latin typeface="Arial"/>
+            </a:endParaRPr>
+          </a:p>
+        </p:txBody>
+      </p:sp>
+      <p:sp>
+        <p:nvSpPr>
+          <p:cNvPr id="100" name="CustomShape 2"/>
           <p:cNvSpPr/>
           <p:nvPr/>
         </p:nvSpPr>
         <p:spPr>
           <a:xfrm>
-            <a:off x="488880" y="2166840"/>
-            <a:ext cx="7508160" cy="5033160"/>
+            <a:off x="488880" y="1359000"/>
+            <a:ext cx="8138520" cy="5497560"/>
           </a:xfrm>
           <a:prstGeom prst="rect">
             <a:avLst/>
@@ -4128,16 +3867,16 @@
               </a:spcBef>
             </a:pPr>
             <a:r>
-              <a:rPr b="0" lang="en-US" sz="2500" spc="-1" strike="noStrike">
-                <a:solidFill>
-                  <a:srgbClr val="404040"/>
-                </a:solidFill>
-                <a:latin typeface="Calibri"/>
-                <a:ea typeface="DejaVu Sans"/>
-              </a:rPr>
-              <a:t>Chọn lọc:</a:t>
-            </a:r>
-            <a:endParaRPr b="0" lang="en-US" sz="2500" spc="-1" strike="noStrike">
+              <a:rPr b="0" lang="en-US" sz="2400" spc="-1" strike="noStrike">
+                <a:solidFill>
+                  <a:srgbClr val="000000"/>
+                </a:solidFill>
+                <a:latin typeface="Times New Roman"/>
+                <a:ea typeface="DejaVu Sans"/>
+              </a:rPr>
+              <a:t>Hàm tính violations (fitness):</a:t>
+            </a:r>
+            <a:endParaRPr b="0" lang="en-US" sz="2400" spc="-1" strike="noStrike">
               <a:latin typeface="Arial"/>
             </a:endParaRPr>
           </a:p>
@@ -4151,16 +3890,16 @@
               </a:spcBef>
             </a:pPr>
             <a:r>
-              <a:rPr b="0" lang="en-US" sz="2500" spc="-1" strike="noStrike">
-                <a:solidFill>
-                  <a:srgbClr val="404040"/>
-                </a:solidFill>
-                <a:latin typeface="Calibri"/>
-                <a:ea typeface="DejaVu Sans"/>
-              </a:rPr>
-              <a:t>Tập quần thể sau khi lai ghép và đột biến ta đưa vào sắp xếp các cá thể theo violations của từng cá thể.</a:t>
-            </a:r>
-            <a:endParaRPr b="0" lang="en-US" sz="2500" spc="-1" strike="noStrike">
+              <a:rPr b="0" lang="en-US" sz="2400" spc="-1" strike="noStrike">
+                <a:solidFill>
+                  <a:srgbClr val="000000"/>
+                </a:solidFill>
+                <a:latin typeface="Times New Roman"/>
+                <a:ea typeface="DejaVu Sans"/>
+              </a:rPr>
+              <a:t>Violations = violationW + violationP + alpha * (violationT + violationR) – beta * sumTrueBin</a:t>
+            </a:r>
+            <a:endParaRPr b="0" lang="en-US" sz="2400" spc="-1" strike="noStrike">
               <a:latin typeface="Arial"/>
             </a:endParaRPr>
           </a:p>
@@ -4173,17 +3912,7 @@
                 <a:spcPts val="751"/>
               </a:spcBef>
             </a:pPr>
-            <a:r>
-              <a:rPr b="0" lang="en-US" sz="2500" spc="-1" strike="noStrike">
-                <a:solidFill>
-                  <a:srgbClr val="404040"/>
-                </a:solidFill>
-                <a:latin typeface="Calibri"/>
-                <a:ea typeface="DejaVu Sans"/>
-              </a:rPr>
-              <a:t>Ta giữ lại 50% cá thể tốt nhất của quần thể còn 50% cá thể còn lại thì ta lấy ngẫu nhiên trong số những cá thể còn lại</a:t>
-            </a:r>
-            <a:endParaRPr b="0" lang="en-US" sz="2500" spc="-1" strike="noStrike">
+            <a:endParaRPr b="0" lang="en-US" sz="2400" spc="-1" strike="noStrike">
               <a:latin typeface="Arial"/>
             </a:endParaRPr>
           </a:p>
@@ -4196,56 +3925,109 @@
                 <a:spcPts val="751"/>
               </a:spcBef>
             </a:pPr>
-            <a:endParaRPr b="0" lang="en-US" sz="2500" spc="-1" strike="noStrike">
-              <a:latin typeface="Arial"/>
-            </a:endParaRPr>
-          </a:p>
-        </p:txBody>
-      </p:sp>
-      <p:sp>
-        <p:nvSpPr>
-          <p:cNvPr id="103" name="CustomShape 3"/>
-          <p:cNvSpPr/>
-          <p:nvPr/>
-        </p:nvSpPr>
-        <p:spPr>
-          <a:xfrm>
-            <a:off x="398880" y="-151560"/>
-            <a:ext cx="8025840" cy="1324800"/>
-          </a:xfrm>
-          <a:prstGeom prst="rect">
-            <a:avLst/>
-          </a:prstGeom>
-          <a:noFill/>
-          <a:ln>
-            <a:noFill/>
-          </a:ln>
-        </p:spPr>
-        <p:style>
-          <a:lnRef idx="0"/>
-          <a:fillRef idx="0"/>
-          <a:effectRef idx="0"/>
-          <a:fontRef idx="minor"/>
-        </p:style>
-        <p:txBody>
-          <a:bodyPr lIns="90000" rIns="90000" tIns="45000" bIns="45000" anchor="ctr"/>
+            <a:r>
+              <a:rPr b="0" lang="en-US" sz="2400" spc="-1" strike="noStrike">
+                <a:solidFill>
+                  <a:srgbClr val="000000"/>
+                </a:solidFill>
+                <a:latin typeface="Times New Roman"/>
+                <a:ea typeface="DejaVu Sans"/>
+              </a:rPr>
+              <a:t>ViolationW = (sumW[i] &gt; W[i]) ? 1 : 0</a:t>
+            </a:r>
+            <a:endParaRPr b="0" lang="en-US" sz="2400" spc="-1" strike="noStrike">
+              <a:latin typeface="Arial"/>
+            </a:endParaRPr>
+          </a:p>
           <a:p>
             <a:pPr>
               <a:lnSpc>
                 <a:spcPct val="90000"/>
               </a:lnSpc>
-            </a:pPr>
-            <a:r>
-              <a:rPr b="1" lang="en-US" sz="3600" spc="-1" strike="noStrike">
-                <a:solidFill>
-                  <a:srgbClr val="ffffff"/>
-                </a:solidFill>
-                <a:latin typeface="Calibri"/>
-                <a:ea typeface="DejaVu Sans"/>
-              </a:rPr>
-              <a:t>3. Genetic Algorithm</a:t>
-            </a:r>
-            <a:endParaRPr b="0" lang="en-US" sz="3600" spc="-1" strike="noStrike">
+              <a:spcBef>
+                <a:spcPts val="751"/>
+              </a:spcBef>
+            </a:pPr>
+            <a:r>
+              <a:rPr b="0" lang="en-US" sz="2400" spc="-1" strike="noStrike">
+                <a:solidFill>
+                  <a:srgbClr val="000000"/>
+                </a:solidFill>
+                <a:latin typeface="Times New Roman"/>
+                <a:ea typeface="DejaVu Sans"/>
+              </a:rPr>
+              <a:t>ViolationP = (sumP[i] &gt; P[i]) ? 1 : 0</a:t>
+            </a:r>
+            <a:endParaRPr b="0" lang="en-US" sz="2400" spc="-1" strike="noStrike">
+              <a:latin typeface="Arial"/>
+            </a:endParaRPr>
+          </a:p>
+          <a:p>
+            <a:pPr>
+              <a:lnSpc>
+                <a:spcPct val="90000"/>
+              </a:lnSpc>
+              <a:spcBef>
+                <a:spcPts val="751"/>
+              </a:spcBef>
+            </a:pPr>
+            <a:r>
+              <a:rPr b="0" lang="en-US" sz="2400" spc="-1" strike="noStrike">
+                <a:solidFill>
+                  <a:srgbClr val="000000"/>
+                </a:solidFill>
+                <a:latin typeface="Times New Roman"/>
+                <a:ea typeface="DejaVu Sans"/>
+              </a:rPr>
+              <a:t>ViolationT = (sumT[i] &gt; T[i]) ? 1 : 0</a:t>
+            </a:r>
+            <a:endParaRPr b="0" lang="en-US" sz="2400" spc="-1" strike="noStrike">
+              <a:latin typeface="Arial"/>
+            </a:endParaRPr>
+          </a:p>
+          <a:p>
+            <a:pPr>
+              <a:lnSpc>
+                <a:spcPct val="90000"/>
+              </a:lnSpc>
+              <a:spcBef>
+                <a:spcPts val="751"/>
+              </a:spcBef>
+            </a:pPr>
+            <a:r>
+              <a:rPr b="0" lang="en-US" sz="2400" spc="-1" strike="noStrike">
+                <a:solidFill>
+                  <a:srgbClr val="000000"/>
+                </a:solidFill>
+                <a:latin typeface="Times New Roman"/>
+                <a:ea typeface="DejaVu Sans"/>
+              </a:rPr>
+              <a:t>ViolationR = (sumR[i] &gt; R[i]) ? 1 : 0</a:t>
+            </a:r>
+            <a:endParaRPr b="0" lang="en-US" sz="2400" spc="-1" strike="noStrike">
+              <a:latin typeface="Arial"/>
+            </a:endParaRPr>
+          </a:p>
+          <a:p>
+            <a:pPr>
+              <a:lnSpc>
+                <a:spcPct val="90000"/>
+              </a:lnSpc>
+              <a:spcBef>
+                <a:spcPts val="751"/>
+              </a:spcBef>
+            </a:pPr>
+            <a:r>
+              <a:rPr b="0" lang="en-US" sz="2400" spc="-1" strike="noStrike">
+                <a:solidFill>
+                  <a:srgbClr val="000000"/>
+                </a:solidFill>
+                <a:latin typeface="Times New Roman"/>
+                <a:ea typeface="DejaVu Sans"/>
+              </a:rPr>
+              <a:t>SumTrueBin = Tổng số bin đúng</a:t>
+            </a:r>
+            <a:endParaRPr b="0" lang="en-US" sz="2400" spc="-1" strike="noStrike">
               <a:latin typeface="Arial"/>
             </a:endParaRPr>
           </a:p>
@@ -4302,14 +4084,14 @@
       </p:grpSpPr>
       <p:sp>
         <p:nvSpPr>
-          <p:cNvPr id="104" name="CustomShape 1"/>
+          <p:cNvPr id="101" name="CustomShape 1"/>
           <p:cNvSpPr/>
           <p:nvPr/>
         </p:nvSpPr>
         <p:spPr>
           <a:xfrm>
             <a:off x="488880" y="-87480"/>
-            <a:ext cx="8025840" cy="1324800"/>
+            <a:ext cx="8025120" cy="1324080"/>
           </a:xfrm>
           <a:prstGeom prst="rect">
             <a:avLst/>
@@ -4325,40 +4107,17 @@
           <a:effectRef idx="0"/>
           <a:fontRef idx="minor"/>
         </p:style>
-        <p:txBody>
-          <a:bodyPr lIns="90000" rIns="90000" tIns="45000" bIns="45000" anchor="ctr"/>
-          <a:p>
-            <a:pPr>
-              <a:lnSpc>
-                <a:spcPct val="90000"/>
-              </a:lnSpc>
-            </a:pPr>
-            <a:r>
-              <a:rPr b="1" lang="en-US" sz="3600" spc="-1" strike="noStrike">
-                <a:solidFill>
-                  <a:srgbClr val="ffffff"/>
-                </a:solidFill>
-                <a:latin typeface="Calibri"/>
-                <a:ea typeface="DejaVu Sans"/>
-              </a:rPr>
-              <a:t>4. Kết quả</a:t>
-            </a:r>
-            <a:endParaRPr b="0" lang="en-US" sz="3600" spc="-1" strike="noStrike">
-              <a:latin typeface="Arial"/>
-            </a:endParaRPr>
-          </a:p>
-        </p:txBody>
-      </p:sp>
-      <p:sp>
-        <p:nvSpPr>
-          <p:cNvPr id="105" name="CustomShape 2"/>
+      </p:sp>
+      <p:sp>
+        <p:nvSpPr>
+          <p:cNvPr id="102" name="CustomShape 2"/>
           <p:cNvSpPr/>
           <p:nvPr/>
         </p:nvSpPr>
         <p:spPr>
           <a:xfrm>
-            <a:off x="604800" y="2440800"/>
-            <a:ext cx="6851160" cy="1937160"/>
+            <a:off x="488880" y="1346040"/>
+            <a:ext cx="8318880" cy="4900680"/>
           </a:xfrm>
           <a:prstGeom prst="rect">
             <a:avLst/>
@@ -4375,75 +4134,181 @@
           <a:fontRef idx="minor"/>
         </p:style>
         <p:txBody>
-          <a:bodyPr lIns="90000" rIns="90000" tIns="45000" bIns="45000">
-            <a:normAutofit/>
-          </a:bodyPr>
+          <a:bodyPr lIns="90000" rIns="90000" tIns="45000" bIns="45000"/>
+          <a:p>
+            <a:pPr marL="343440" algn="just">
+              <a:lnSpc>
+                <a:spcPct val="90000"/>
+              </a:lnSpc>
+              <a:spcBef>
+                <a:spcPts val="374"/>
+              </a:spcBef>
+            </a:pPr>
+            <a:r>
+              <a:rPr b="0" lang="en-US" sz="2400" spc="-1" strike="noStrike">
+                <a:solidFill>
+                  <a:srgbClr val="404040"/>
+                </a:solidFill>
+                <a:latin typeface="Calibri"/>
+                <a:ea typeface="DejaVu Sans"/>
+              </a:rPr>
+              <a:t>Mô hình thuật toán:</a:t>
+            </a:r>
+            <a:endParaRPr b="0" lang="en-US" sz="2400" spc="-1" strike="noStrike">
+              <a:latin typeface="Arial"/>
+            </a:endParaRPr>
+          </a:p>
+          <a:p>
+            <a:pPr marL="343440" algn="just">
+              <a:lnSpc>
+                <a:spcPct val="90000"/>
+              </a:lnSpc>
+              <a:spcBef>
+                <a:spcPts val="374"/>
+              </a:spcBef>
+            </a:pPr>
+            <a:r>
+              <a:rPr b="0" lang="en-US" sz="2400" spc="-1" strike="noStrike">
+                <a:solidFill>
+                  <a:srgbClr val="404040"/>
+                </a:solidFill>
+                <a:latin typeface="Calibri"/>
+                <a:ea typeface="DejaVu Sans"/>
+              </a:rPr>
+              <a:t>Khai báo các class:</a:t>
+            </a:r>
+            <a:endParaRPr b="0" lang="en-US" sz="2400" spc="-1" strike="noStrike">
+              <a:latin typeface="Arial"/>
+            </a:endParaRPr>
+          </a:p>
+          <a:p>
+            <a:pPr marL="343440" algn="just">
+              <a:lnSpc>
+                <a:spcPct val="90000"/>
+              </a:lnSpc>
+              <a:spcBef>
+                <a:spcPts val="374"/>
+              </a:spcBef>
+            </a:pPr>
+            <a:r>
+              <a:rPr b="0" lang="en-US" sz="2400" spc="-1" strike="noStrike">
+                <a:solidFill>
+                  <a:srgbClr val="404040"/>
+                </a:solidFill>
+                <a:latin typeface="Calibri"/>
+                <a:ea typeface="DejaVu Sans"/>
+              </a:rPr>
+              <a:t>Gen: Là các item có các thuộc tính w, p, t, r của item đó</a:t>
+            </a:r>
+            <a:endParaRPr b="0" lang="en-US" sz="2400" spc="-1" strike="noStrike">
+              <a:latin typeface="Arial"/>
+            </a:endParaRPr>
+          </a:p>
+          <a:p>
+            <a:pPr marL="343440" algn="just">
+              <a:lnSpc>
+                <a:spcPct val="90000"/>
+              </a:lnSpc>
+              <a:spcBef>
+                <a:spcPts val="374"/>
+              </a:spcBef>
+            </a:pPr>
+            <a:r>
+              <a:rPr b="0" lang="en-US" sz="2400" spc="-1" strike="noStrike">
+                <a:solidFill>
+                  <a:srgbClr val="404040"/>
+                </a:solidFill>
+                <a:latin typeface="Calibri"/>
+                <a:ea typeface="DejaVu Sans"/>
+              </a:rPr>
+              <a:t>Individual: Là tập n các Gen, một solution cho bài toán</a:t>
+            </a:r>
+            <a:endParaRPr b="0" lang="en-US" sz="2400" spc="-1" strike="noStrike">
+              <a:latin typeface="Arial"/>
+            </a:endParaRPr>
+          </a:p>
+          <a:p>
+            <a:pPr marL="343440" algn="just">
+              <a:lnSpc>
+                <a:spcPct val="90000"/>
+              </a:lnSpc>
+              <a:spcBef>
+                <a:spcPts val="374"/>
+              </a:spcBef>
+            </a:pPr>
+            <a:r>
+              <a:rPr b="0" lang="en-US" sz="2400" spc="-1" strike="noStrike">
+                <a:solidFill>
+                  <a:srgbClr val="404040"/>
+                </a:solidFill>
+                <a:latin typeface="Calibri"/>
+                <a:ea typeface="DejaVu Sans"/>
+              </a:rPr>
+              <a:t>Population: Là tập các Individual các solution có thể của bài toán</a:t>
+            </a:r>
+            <a:endParaRPr b="0" lang="en-US" sz="2400" spc="-1" strike="noStrike">
+              <a:latin typeface="Arial"/>
+            </a:endParaRPr>
+          </a:p>
+          <a:p>
+            <a:pPr marL="343440" algn="just">
+              <a:lnSpc>
+                <a:spcPct val="90000"/>
+              </a:lnSpc>
+              <a:spcBef>
+                <a:spcPts val="374"/>
+              </a:spcBef>
+            </a:pPr>
+            <a:endParaRPr b="0" lang="en-US" sz="2400" spc="-1" strike="noStrike">
+              <a:latin typeface="Arial"/>
+            </a:endParaRPr>
+          </a:p>
+        </p:txBody>
+      </p:sp>
+      <p:sp>
+        <p:nvSpPr>
+          <p:cNvPr id="103" name="CustomShape 3"/>
+          <p:cNvSpPr/>
+          <p:nvPr/>
+        </p:nvSpPr>
+        <p:spPr>
+          <a:xfrm>
+            <a:off x="398880" y="-151560"/>
+            <a:ext cx="8025120" cy="1324080"/>
+          </a:xfrm>
+          <a:prstGeom prst="rect">
+            <a:avLst/>
+          </a:prstGeom>
+          <a:noFill/>
+          <a:ln>
+            <a:noFill/>
+          </a:ln>
+        </p:spPr>
+        <p:style>
+          <a:lnRef idx="0"/>
+          <a:fillRef idx="0"/>
+          <a:effectRef idx="0"/>
+          <a:fontRef idx="minor"/>
+        </p:style>
+        <p:txBody>
+          <a:bodyPr lIns="90000" rIns="90000" tIns="45000" bIns="45000" anchor="ctr"/>
           <a:p>
             <a:pPr>
               <a:lnSpc>
                 <a:spcPct val="90000"/>
               </a:lnSpc>
-              <a:spcBef>
-                <a:spcPts val="751"/>
-              </a:spcBef>
-            </a:pPr>
-            <a:r>
-              <a:rPr b="0" lang="en-US" sz="3200" spc="-1" strike="noStrike">
-                <a:solidFill>
-                  <a:srgbClr val="404040"/>
+            </a:pPr>
+            <a:r>
+              <a:rPr b="1" lang="en-US" sz="3600" spc="-1" strike="noStrike">
+                <a:solidFill>
+                  <a:srgbClr val="ffffff"/>
                 </a:solidFill>
                 <a:latin typeface="Calibri"/>
                 <a:ea typeface="DejaVu Sans"/>
               </a:rPr>
-              <a:t>Bộ dữ liệu 100: Không xếp đc</a:t>
-            </a:r>
-            <a:endParaRPr b="0" lang="en-US" sz="3200" spc="-1" strike="noStrike">
-              <a:latin typeface="Arial"/>
-            </a:endParaRPr>
-          </a:p>
-          <a:p>
-            <a:pPr>
-              <a:lnSpc>
-                <a:spcPct val="90000"/>
-              </a:lnSpc>
-              <a:spcBef>
-                <a:spcPts val="751"/>
-              </a:spcBef>
-            </a:pPr>
-            <a:r>
-              <a:rPr b="0" lang="en-US" sz="3200" spc="-1" strike="noStrike">
-                <a:solidFill>
-                  <a:srgbClr val="404040"/>
-                </a:solidFill>
-                <a:latin typeface="Calibri"/>
-                <a:ea typeface="DejaVu Sans"/>
-              </a:rPr>
-              <a:t>Bộ dữ liệu 1000: xếp được 583 item</a:t>
-            </a:r>
-            <a:endParaRPr b="0" lang="en-US" sz="3200" spc="-1" strike="noStrike">
-              <a:latin typeface="Arial"/>
-            </a:endParaRPr>
-          </a:p>
-          <a:p>
-            <a:pPr>
-              <a:lnSpc>
-                <a:spcPct val="90000"/>
-              </a:lnSpc>
-              <a:spcBef>
-                <a:spcPts val="751"/>
-              </a:spcBef>
-            </a:pPr>
-            <a:r>
-              <a:rPr b="0" lang="en-US" sz="3200" spc="-1" strike="noStrike">
-                <a:solidFill>
-                  <a:srgbClr val="404040"/>
-                </a:solidFill>
-                <a:latin typeface="Calibri"/>
-                <a:ea typeface="DejaVu Sans"/>
-              </a:rPr>
-              <a:t>Bộ dữ liệu 3000: xếp được 2292 item</a:t>
-            </a:r>
-            <a:endParaRPr b="0" lang="en-US" sz="3200" spc="-1" strike="noStrike">
+              <a:t>3. Genetic Algorithm</a:t>
+            </a:r>
+            <a:endParaRPr b="0" lang="en-US" sz="3600" spc="-1" strike="noStrike">
               <a:latin typeface="Arial"/>
             </a:endParaRPr>
           </a:p>
@@ -4458,6 +4323,924 @@
           <p:childTnLst>
             <p:seq>
               <p:cTn id="24" dur="indefinite" nodeType="mainSeq"/>
+              <p:prevCondLst>
+                <p:cond delay="0" evt="onPrev">
+                  <p:tgtEl>
+                    <p:sldTgt/>
+                  </p:tgtEl>
+                </p:cond>
+              </p:prevCondLst>
+              <p:nextCondLst>
+                <p:cond delay="0" evt="onNext">
+                  <p:tgtEl>
+                    <p:sldTgt/>
+                  </p:tgtEl>
+                </p:cond>
+              </p:nextCondLst>
+            </p:seq>
+          </p:childTnLst>
+        </p:cTn>
+      </p:par>
+    </p:tnLst>
+  </p:timing>
+</p:sld>
+</file>
+
+<file path=ppt/slides/slide13.xml><?xml version="1.0" encoding="utf-8"?>
+<p:sld xmlns:a="http://schemas.openxmlformats.org/drawingml/2006/main" xmlns:p="http://schemas.openxmlformats.org/presentationml/2006/main" xmlns:r="http://schemas.openxmlformats.org/officeDocument/2006/relationships" xmlns:p14="http://schemas.microsoft.com/office/powerpoint/2010/main" xmlns:p15="http://schemas.microsoft.com/office/powerpoint/2012/main" xmlns:mc="http://schemas.openxmlformats.org/markup-compatibility/2006">
+  <p:cSld>
+    <p:spTree>
+      <p:nvGrpSpPr>
+        <p:cNvPr id="1" name=""/>
+        <p:cNvGrpSpPr/>
+        <p:nvPr/>
+      </p:nvGrpSpPr>
+      <p:grpSpPr>
+        <a:xfrm>
+          <a:off x="0" y="0"/>
+          <a:ext cx="0" cy="0"/>
+          <a:chOff x="0" y="0"/>
+          <a:chExt cx="0" cy="0"/>
+        </a:xfrm>
+      </p:grpSpPr>
+      <p:sp>
+        <p:nvSpPr>
+          <p:cNvPr id="104" name="CustomShape 1"/>
+          <p:cNvSpPr/>
+          <p:nvPr/>
+        </p:nvSpPr>
+        <p:spPr>
+          <a:xfrm>
+            <a:off x="488880" y="-87480"/>
+            <a:ext cx="8025120" cy="1324080"/>
+          </a:xfrm>
+          <a:prstGeom prst="rect">
+            <a:avLst/>
+          </a:prstGeom>
+          <a:noFill/>
+          <a:ln>
+            <a:noFill/>
+          </a:ln>
+        </p:spPr>
+        <p:style>
+          <a:lnRef idx="0"/>
+          <a:fillRef idx="0"/>
+          <a:effectRef idx="0"/>
+          <a:fontRef idx="minor"/>
+        </p:style>
+      </p:sp>
+      <p:sp>
+        <p:nvSpPr>
+          <p:cNvPr id="105" name="CustomShape 2"/>
+          <p:cNvSpPr/>
+          <p:nvPr/>
+        </p:nvSpPr>
+        <p:spPr>
+          <a:xfrm>
+            <a:off x="488880" y="1346040"/>
+            <a:ext cx="8025120" cy="4900680"/>
+          </a:xfrm>
+          <a:prstGeom prst="rect">
+            <a:avLst/>
+          </a:prstGeom>
+          <a:noFill/>
+          <a:ln>
+            <a:noFill/>
+          </a:ln>
+        </p:spPr>
+        <p:style>
+          <a:lnRef idx="0"/>
+          <a:fillRef idx="0"/>
+          <a:effectRef idx="0"/>
+          <a:fontRef idx="minor"/>
+        </p:style>
+        <p:txBody>
+          <a:bodyPr lIns="90000" rIns="90000" tIns="45000" bIns="45000"/>
+          <a:p>
+            <a:pPr>
+              <a:lnSpc>
+                <a:spcPct val="90000"/>
+              </a:lnSpc>
+              <a:spcBef>
+                <a:spcPts val="751"/>
+              </a:spcBef>
+            </a:pPr>
+            <a:r>
+              <a:rPr b="0" lang="en-US" sz="2400" spc="-1" strike="noStrike">
+                <a:solidFill>
+                  <a:srgbClr val="404040"/>
+                </a:solidFill>
+                <a:latin typeface="Calibri"/>
+                <a:ea typeface="DejaVu Sans"/>
+              </a:rPr>
+              <a:t>Các thuật toán di truyền:</a:t>
+            </a:r>
+            <a:endParaRPr b="0" lang="en-US" sz="2400" spc="-1" strike="noStrike">
+              <a:latin typeface="Arial"/>
+            </a:endParaRPr>
+          </a:p>
+          <a:p>
+            <a:pPr>
+              <a:lnSpc>
+                <a:spcPct val="90000"/>
+              </a:lnSpc>
+              <a:spcBef>
+                <a:spcPts val="751"/>
+              </a:spcBef>
+            </a:pPr>
+            <a:r>
+              <a:rPr b="0" lang="en-US" sz="2400" spc="-1" strike="noStrike">
+                <a:solidFill>
+                  <a:srgbClr val="404040"/>
+                </a:solidFill>
+                <a:latin typeface="Calibri"/>
+                <a:ea typeface="DejaVu Sans"/>
+              </a:rPr>
+              <a:t>Lai ghép: Chọn ra 2 cá thể trong số những cá thể của Population rồi cho lai ghép với nhau theo xác suất</a:t>
+            </a:r>
+            <a:endParaRPr b="0" lang="en-US" sz="2400" spc="-1" strike="noStrike">
+              <a:latin typeface="Arial"/>
+            </a:endParaRPr>
+          </a:p>
+          <a:p>
+            <a:pPr>
+              <a:lnSpc>
+                <a:spcPct val="90000"/>
+              </a:lnSpc>
+              <a:spcBef>
+                <a:spcPts val="751"/>
+              </a:spcBef>
+            </a:pPr>
+            <a:endParaRPr b="0" lang="en-US" sz="2400" spc="-1" strike="noStrike">
+              <a:latin typeface="Arial"/>
+            </a:endParaRPr>
+          </a:p>
+        </p:txBody>
+      </p:sp>
+      <p:sp>
+        <p:nvSpPr>
+          <p:cNvPr id="106" name="CustomShape 3"/>
+          <p:cNvSpPr/>
+          <p:nvPr/>
+        </p:nvSpPr>
+        <p:spPr>
+          <a:xfrm>
+            <a:off x="398880" y="-151560"/>
+            <a:ext cx="8025120" cy="1324080"/>
+          </a:xfrm>
+          <a:prstGeom prst="rect">
+            <a:avLst/>
+          </a:prstGeom>
+          <a:noFill/>
+          <a:ln>
+            <a:noFill/>
+          </a:ln>
+        </p:spPr>
+        <p:style>
+          <a:lnRef idx="0"/>
+          <a:fillRef idx="0"/>
+          <a:effectRef idx="0"/>
+          <a:fontRef idx="minor"/>
+        </p:style>
+        <p:txBody>
+          <a:bodyPr lIns="90000" rIns="90000" tIns="45000" bIns="45000" anchor="ctr"/>
+          <a:p>
+            <a:pPr>
+              <a:lnSpc>
+                <a:spcPct val="90000"/>
+              </a:lnSpc>
+            </a:pPr>
+            <a:r>
+              <a:rPr b="1" lang="en-US" sz="3600" spc="-1" strike="noStrike">
+                <a:solidFill>
+                  <a:srgbClr val="ffffff"/>
+                </a:solidFill>
+                <a:latin typeface="Calibri"/>
+                <a:ea typeface="DejaVu Sans"/>
+              </a:rPr>
+              <a:t>3. Genetic Algorithm</a:t>
+            </a:r>
+            <a:endParaRPr b="0" lang="en-US" sz="3600" spc="-1" strike="noStrike">
+              <a:latin typeface="Arial"/>
+            </a:endParaRPr>
+          </a:p>
+        </p:txBody>
+      </p:sp>
+      <p:pic>
+        <p:nvPicPr>
+          <p:cNvPr id="107" name="" descr=""/>
+          <p:cNvPicPr/>
+          <p:nvPr/>
+        </p:nvPicPr>
+        <p:blipFill>
+          <a:blip r:embed="rId1"/>
+          <a:stretch/>
+        </p:blipFill>
+        <p:spPr>
+          <a:xfrm>
+            <a:off x="731520" y="3408480"/>
+            <a:ext cx="7499160" cy="1711800"/>
+          </a:xfrm>
+          <a:prstGeom prst="rect">
+            <a:avLst/>
+          </a:prstGeom>
+          <a:ln>
+            <a:noFill/>
+          </a:ln>
+        </p:spPr>
+      </p:pic>
+    </p:spTree>
+  </p:cSld>
+  <p:timing>
+    <p:tnLst>
+      <p:par>
+        <p:cTn id="25" dur="indefinite" restart="never" nodeType="tmRoot">
+          <p:childTnLst>
+            <p:seq>
+              <p:cTn id="26" dur="indefinite" nodeType="mainSeq"/>
+              <p:prevCondLst>
+                <p:cond delay="0" evt="onPrev">
+                  <p:tgtEl>
+                    <p:sldTgt/>
+                  </p:tgtEl>
+                </p:cond>
+              </p:prevCondLst>
+              <p:nextCondLst>
+                <p:cond delay="0" evt="onNext">
+                  <p:tgtEl>
+                    <p:sldTgt/>
+                  </p:tgtEl>
+                </p:cond>
+              </p:nextCondLst>
+            </p:seq>
+          </p:childTnLst>
+        </p:cTn>
+      </p:par>
+    </p:tnLst>
+  </p:timing>
+</p:sld>
+</file>
+
+<file path=ppt/slides/slide14.xml><?xml version="1.0" encoding="utf-8"?>
+<p:sld xmlns:a="http://schemas.openxmlformats.org/drawingml/2006/main" xmlns:p="http://schemas.openxmlformats.org/presentationml/2006/main" xmlns:r="http://schemas.openxmlformats.org/officeDocument/2006/relationships" xmlns:p14="http://schemas.microsoft.com/office/powerpoint/2010/main" xmlns:p15="http://schemas.microsoft.com/office/powerpoint/2012/main" xmlns:mc="http://schemas.openxmlformats.org/markup-compatibility/2006">
+  <p:cSld>
+    <p:spTree>
+      <p:nvGrpSpPr>
+        <p:cNvPr id="1" name=""/>
+        <p:cNvGrpSpPr/>
+        <p:nvPr/>
+      </p:nvGrpSpPr>
+      <p:grpSpPr>
+        <a:xfrm>
+          <a:off x="0" y="0"/>
+          <a:ext cx="0" cy="0"/>
+          <a:chOff x="0" y="0"/>
+          <a:chExt cx="0" cy="0"/>
+        </a:xfrm>
+      </p:grpSpPr>
+      <p:sp>
+        <p:nvSpPr>
+          <p:cNvPr id="108" name="CustomShape 1"/>
+          <p:cNvSpPr/>
+          <p:nvPr/>
+        </p:nvSpPr>
+        <p:spPr>
+          <a:xfrm>
+            <a:off x="488880" y="-87480"/>
+            <a:ext cx="8025120" cy="1324080"/>
+          </a:xfrm>
+          <a:prstGeom prst="rect">
+            <a:avLst/>
+          </a:prstGeom>
+          <a:noFill/>
+          <a:ln>
+            <a:noFill/>
+          </a:ln>
+        </p:spPr>
+        <p:style>
+          <a:lnRef idx="0"/>
+          <a:fillRef idx="0"/>
+          <a:effectRef idx="0"/>
+          <a:fontRef idx="minor"/>
+        </p:style>
+      </p:sp>
+      <p:sp>
+        <p:nvSpPr>
+          <p:cNvPr id="109" name="CustomShape 2"/>
+          <p:cNvSpPr/>
+          <p:nvPr/>
+        </p:nvSpPr>
+        <p:spPr>
+          <a:xfrm>
+            <a:off x="488880" y="1346040"/>
+            <a:ext cx="8025120" cy="4900680"/>
+          </a:xfrm>
+          <a:prstGeom prst="rect">
+            <a:avLst/>
+          </a:prstGeom>
+          <a:noFill/>
+          <a:ln>
+            <a:noFill/>
+          </a:ln>
+        </p:spPr>
+        <p:style>
+          <a:lnRef idx="0"/>
+          <a:fillRef idx="0"/>
+          <a:effectRef idx="0"/>
+          <a:fontRef idx="minor"/>
+        </p:style>
+        <p:txBody>
+          <a:bodyPr lIns="90000" rIns="90000" tIns="45000" bIns="45000"/>
+          <a:p>
+            <a:pPr>
+              <a:lnSpc>
+                <a:spcPct val="90000"/>
+              </a:lnSpc>
+              <a:spcBef>
+                <a:spcPts val="751"/>
+              </a:spcBef>
+            </a:pPr>
+            <a:r>
+              <a:rPr b="0" lang="en-US" sz="2400" spc="-1" strike="noStrike">
+                <a:solidFill>
+                  <a:srgbClr val="404040"/>
+                </a:solidFill>
+                <a:latin typeface="Calibri"/>
+                <a:ea typeface="DejaVu Sans"/>
+              </a:rPr>
+              <a:t>Các thuật toán di truyền:</a:t>
+            </a:r>
+            <a:endParaRPr b="0" lang="en-US" sz="2400" spc="-1" strike="noStrike">
+              <a:latin typeface="Arial"/>
+            </a:endParaRPr>
+          </a:p>
+        </p:txBody>
+      </p:sp>
+      <p:sp>
+        <p:nvSpPr>
+          <p:cNvPr id="110" name="CustomShape 3"/>
+          <p:cNvSpPr/>
+          <p:nvPr/>
+        </p:nvSpPr>
+        <p:spPr>
+          <a:xfrm>
+            <a:off x="398880" y="-151560"/>
+            <a:ext cx="8025120" cy="1324080"/>
+          </a:xfrm>
+          <a:prstGeom prst="rect">
+            <a:avLst/>
+          </a:prstGeom>
+          <a:noFill/>
+          <a:ln>
+            <a:noFill/>
+          </a:ln>
+        </p:spPr>
+        <p:style>
+          <a:lnRef idx="0"/>
+          <a:fillRef idx="0"/>
+          <a:effectRef idx="0"/>
+          <a:fontRef idx="minor"/>
+        </p:style>
+        <p:txBody>
+          <a:bodyPr lIns="90000" rIns="90000" tIns="45000" bIns="45000" anchor="ctr"/>
+          <a:p>
+            <a:pPr>
+              <a:lnSpc>
+                <a:spcPct val="90000"/>
+              </a:lnSpc>
+            </a:pPr>
+            <a:r>
+              <a:rPr b="1" lang="en-US" sz="3600" spc="-1" strike="noStrike">
+                <a:solidFill>
+                  <a:srgbClr val="ffffff"/>
+                </a:solidFill>
+                <a:latin typeface="Calibri"/>
+                <a:ea typeface="DejaVu Sans"/>
+              </a:rPr>
+              <a:t>3. Genetic Algorithm</a:t>
+            </a:r>
+            <a:endParaRPr b="0" lang="en-US" sz="3600" spc="-1" strike="noStrike">
+              <a:latin typeface="Arial"/>
+            </a:endParaRPr>
+          </a:p>
+        </p:txBody>
+      </p:sp>
+      <p:sp>
+        <p:nvSpPr>
+          <p:cNvPr id="111" name="CustomShape 4"/>
+          <p:cNvSpPr/>
+          <p:nvPr/>
+        </p:nvSpPr>
+        <p:spPr>
+          <a:xfrm>
+            <a:off x="640080" y="1905840"/>
+            <a:ext cx="8278200" cy="800280"/>
+          </a:xfrm>
+          <a:prstGeom prst="rect">
+            <a:avLst/>
+          </a:prstGeom>
+          <a:noFill/>
+          <a:ln>
+            <a:noFill/>
+          </a:ln>
+        </p:spPr>
+        <p:style>
+          <a:lnRef idx="0"/>
+          <a:fillRef idx="0"/>
+          <a:effectRef idx="0"/>
+          <a:fontRef idx="minor"/>
+        </p:style>
+        <p:txBody>
+          <a:bodyPr lIns="90000" rIns="90000" tIns="45000" bIns="45000"/>
+          <a:p>
+            <a:pPr>
+              <a:lnSpc>
+                <a:spcPct val="100000"/>
+              </a:lnSpc>
+            </a:pPr>
+            <a:r>
+              <a:rPr b="0" lang="en-US" sz="2400" spc="-1" strike="noStrike">
+                <a:solidFill>
+                  <a:srgbClr val="404040"/>
+                </a:solidFill>
+                <a:latin typeface="Calibri"/>
+                <a:ea typeface="DejaVu Sans"/>
+              </a:rPr>
+              <a:t>Đột biến: Chọn ra một cá thể rồi sau đó thay đổi một số điểm của cá thể này</a:t>
+            </a:r>
+            <a:endParaRPr b="0" lang="en-US" sz="2400" spc="-1" strike="noStrike">
+              <a:latin typeface="Arial"/>
+            </a:endParaRPr>
+          </a:p>
+        </p:txBody>
+      </p:sp>
+      <p:pic>
+        <p:nvPicPr>
+          <p:cNvPr id="112" name="" descr=""/>
+          <p:cNvPicPr/>
+          <p:nvPr/>
+        </p:nvPicPr>
+        <p:blipFill>
+          <a:blip r:embed="rId1"/>
+          <a:stretch/>
+        </p:blipFill>
+        <p:spPr>
+          <a:xfrm>
+            <a:off x="2110320" y="3032280"/>
+            <a:ext cx="5011560" cy="2715840"/>
+          </a:xfrm>
+          <a:prstGeom prst="rect">
+            <a:avLst/>
+          </a:prstGeom>
+          <a:ln>
+            <a:noFill/>
+          </a:ln>
+        </p:spPr>
+      </p:pic>
+    </p:spTree>
+  </p:cSld>
+  <p:timing>
+    <p:tnLst>
+      <p:par>
+        <p:cTn id="27" dur="indefinite" restart="never" nodeType="tmRoot">
+          <p:childTnLst>
+            <p:seq>
+              <p:cTn id="28" dur="indefinite" nodeType="mainSeq"/>
+              <p:prevCondLst>
+                <p:cond delay="0" evt="onPrev">
+                  <p:tgtEl>
+                    <p:sldTgt/>
+                  </p:tgtEl>
+                </p:cond>
+              </p:prevCondLst>
+              <p:nextCondLst>
+                <p:cond delay="0" evt="onNext">
+                  <p:tgtEl>
+                    <p:sldTgt/>
+                  </p:tgtEl>
+                </p:cond>
+              </p:nextCondLst>
+            </p:seq>
+          </p:childTnLst>
+        </p:cTn>
+      </p:par>
+    </p:tnLst>
+  </p:timing>
+</p:sld>
+</file>
+
+<file path=ppt/slides/slide15.xml><?xml version="1.0" encoding="utf-8"?>
+<p:sld xmlns:a="http://schemas.openxmlformats.org/drawingml/2006/main" xmlns:p="http://schemas.openxmlformats.org/presentationml/2006/main" xmlns:r="http://schemas.openxmlformats.org/officeDocument/2006/relationships" xmlns:p14="http://schemas.microsoft.com/office/powerpoint/2010/main" xmlns:p15="http://schemas.microsoft.com/office/powerpoint/2012/main" xmlns:mc="http://schemas.openxmlformats.org/markup-compatibility/2006">
+  <p:cSld>
+    <p:spTree>
+      <p:nvGrpSpPr>
+        <p:cNvPr id="1" name=""/>
+        <p:cNvGrpSpPr/>
+        <p:nvPr/>
+      </p:nvGrpSpPr>
+      <p:grpSpPr>
+        <a:xfrm>
+          <a:off x="0" y="0"/>
+          <a:ext cx="0" cy="0"/>
+          <a:chOff x="0" y="0"/>
+          <a:chExt cx="0" cy="0"/>
+        </a:xfrm>
+      </p:grpSpPr>
+      <p:sp>
+        <p:nvSpPr>
+          <p:cNvPr id="113" name="CustomShape 1"/>
+          <p:cNvSpPr/>
+          <p:nvPr/>
+        </p:nvSpPr>
+        <p:spPr>
+          <a:xfrm>
+            <a:off x="488880" y="-87480"/>
+            <a:ext cx="8025120" cy="1324080"/>
+          </a:xfrm>
+          <a:prstGeom prst="rect">
+            <a:avLst/>
+          </a:prstGeom>
+          <a:noFill/>
+          <a:ln>
+            <a:noFill/>
+          </a:ln>
+        </p:spPr>
+        <p:style>
+          <a:lnRef idx="0"/>
+          <a:fillRef idx="0"/>
+          <a:effectRef idx="0"/>
+          <a:fontRef idx="minor"/>
+        </p:style>
+      </p:sp>
+      <p:sp>
+        <p:nvSpPr>
+          <p:cNvPr id="114" name="CustomShape 2"/>
+          <p:cNvSpPr/>
+          <p:nvPr/>
+        </p:nvSpPr>
+        <p:spPr>
+          <a:xfrm>
+            <a:off x="488880" y="2166840"/>
+            <a:ext cx="7507440" cy="5032440"/>
+          </a:xfrm>
+          <a:prstGeom prst="rect">
+            <a:avLst/>
+          </a:prstGeom>
+          <a:noFill/>
+          <a:ln>
+            <a:noFill/>
+          </a:ln>
+        </p:spPr>
+        <p:style>
+          <a:lnRef idx="0"/>
+          <a:fillRef idx="0"/>
+          <a:effectRef idx="0"/>
+          <a:fontRef idx="minor"/>
+        </p:style>
+        <p:txBody>
+          <a:bodyPr lIns="90000" rIns="90000" tIns="45000" bIns="45000">
+            <a:normAutofit/>
+          </a:bodyPr>
+          <a:p>
+            <a:pPr>
+              <a:lnSpc>
+                <a:spcPct val="90000"/>
+              </a:lnSpc>
+              <a:spcBef>
+                <a:spcPts val="751"/>
+              </a:spcBef>
+            </a:pPr>
+            <a:r>
+              <a:rPr b="0" lang="en-US" sz="2500" spc="-1" strike="noStrike">
+                <a:solidFill>
+                  <a:srgbClr val="404040"/>
+                </a:solidFill>
+                <a:latin typeface="Calibri"/>
+                <a:ea typeface="DejaVu Sans"/>
+              </a:rPr>
+              <a:t>Chọn lọc:</a:t>
+            </a:r>
+            <a:endParaRPr b="0" lang="en-US" sz="2500" spc="-1" strike="noStrike">
+              <a:latin typeface="Arial"/>
+            </a:endParaRPr>
+          </a:p>
+          <a:p>
+            <a:pPr>
+              <a:lnSpc>
+                <a:spcPct val="90000"/>
+              </a:lnSpc>
+              <a:spcBef>
+                <a:spcPts val="751"/>
+              </a:spcBef>
+            </a:pPr>
+            <a:r>
+              <a:rPr b="0" lang="en-US" sz="2500" spc="-1" strike="noStrike">
+                <a:solidFill>
+                  <a:srgbClr val="404040"/>
+                </a:solidFill>
+                <a:latin typeface="Calibri"/>
+                <a:ea typeface="DejaVu Sans"/>
+              </a:rPr>
+              <a:t>Tập quần thể sau khi lai ghép và đột biến ta đưa vào sắp xếp các cá thể theo violations của từng cá thể.</a:t>
+            </a:r>
+            <a:endParaRPr b="0" lang="en-US" sz="2500" spc="-1" strike="noStrike">
+              <a:latin typeface="Arial"/>
+            </a:endParaRPr>
+          </a:p>
+          <a:p>
+            <a:pPr>
+              <a:lnSpc>
+                <a:spcPct val="90000"/>
+              </a:lnSpc>
+              <a:spcBef>
+                <a:spcPts val="751"/>
+              </a:spcBef>
+            </a:pPr>
+            <a:r>
+              <a:rPr b="0" lang="en-US" sz="2500" spc="-1" strike="noStrike">
+                <a:solidFill>
+                  <a:srgbClr val="404040"/>
+                </a:solidFill>
+                <a:latin typeface="Calibri"/>
+                <a:ea typeface="DejaVu Sans"/>
+              </a:rPr>
+              <a:t>Ta giữ lại 50% cá thể tốt nhất của quần thể còn 50% cá thể còn lại thì ta lấy ngẫu nhiên trong số những cá thể còn lại</a:t>
+            </a:r>
+            <a:endParaRPr b="0" lang="en-US" sz="2500" spc="-1" strike="noStrike">
+              <a:latin typeface="Arial"/>
+            </a:endParaRPr>
+          </a:p>
+          <a:p>
+            <a:pPr>
+              <a:lnSpc>
+                <a:spcPct val="90000"/>
+              </a:lnSpc>
+              <a:spcBef>
+                <a:spcPts val="751"/>
+              </a:spcBef>
+            </a:pPr>
+            <a:endParaRPr b="0" lang="en-US" sz="2500" spc="-1" strike="noStrike">
+              <a:latin typeface="Arial"/>
+            </a:endParaRPr>
+          </a:p>
+        </p:txBody>
+      </p:sp>
+      <p:sp>
+        <p:nvSpPr>
+          <p:cNvPr id="115" name="CustomShape 3"/>
+          <p:cNvSpPr/>
+          <p:nvPr/>
+        </p:nvSpPr>
+        <p:spPr>
+          <a:xfrm>
+            <a:off x="398880" y="-151560"/>
+            <a:ext cx="8025120" cy="1324080"/>
+          </a:xfrm>
+          <a:prstGeom prst="rect">
+            <a:avLst/>
+          </a:prstGeom>
+          <a:noFill/>
+          <a:ln>
+            <a:noFill/>
+          </a:ln>
+        </p:spPr>
+        <p:style>
+          <a:lnRef idx="0"/>
+          <a:fillRef idx="0"/>
+          <a:effectRef idx="0"/>
+          <a:fontRef idx="minor"/>
+        </p:style>
+        <p:txBody>
+          <a:bodyPr lIns="90000" rIns="90000" tIns="45000" bIns="45000" anchor="ctr"/>
+          <a:p>
+            <a:pPr>
+              <a:lnSpc>
+                <a:spcPct val="90000"/>
+              </a:lnSpc>
+            </a:pPr>
+            <a:r>
+              <a:rPr b="1" lang="en-US" sz="3600" spc="-1" strike="noStrike">
+                <a:solidFill>
+                  <a:srgbClr val="ffffff"/>
+                </a:solidFill>
+                <a:latin typeface="Calibri"/>
+                <a:ea typeface="DejaVu Sans"/>
+              </a:rPr>
+              <a:t>3. Genetic Algorithm</a:t>
+            </a:r>
+            <a:endParaRPr b="0" lang="en-US" sz="3600" spc="-1" strike="noStrike">
+              <a:latin typeface="Arial"/>
+            </a:endParaRPr>
+          </a:p>
+        </p:txBody>
+      </p:sp>
+    </p:spTree>
+  </p:cSld>
+  <p:timing>
+    <p:tnLst>
+      <p:par>
+        <p:cTn id="29" dur="indefinite" restart="never" nodeType="tmRoot">
+          <p:childTnLst>
+            <p:seq>
+              <p:cTn id="30" dur="indefinite" nodeType="mainSeq"/>
+              <p:prevCondLst>
+                <p:cond delay="0" evt="onPrev">
+                  <p:tgtEl>
+                    <p:sldTgt/>
+                  </p:tgtEl>
+                </p:cond>
+              </p:prevCondLst>
+              <p:nextCondLst>
+                <p:cond delay="0" evt="onNext">
+                  <p:tgtEl>
+                    <p:sldTgt/>
+                  </p:tgtEl>
+                </p:cond>
+              </p:nextCondLst>
+            </p:seq>
+          </p:childTnLst>
+        </p:cTn>
+      </p:par>
+    </p:tnLst>
+  </p:timing>
+</p:sld>
+</file>
+
+<file path=ppt/slides/slide16.xml><?xml version="1.0" encoding="utf-8"?>
+<p:sld xmlns:a="http://schemas.openxmlformats.org/drawingml/2006/main" xmlns:p="http://schemas.openxmlformats.org/presentationml/2006/main" xmlns:r="http://schemas.openxmlformats.org/officeDocument/2006/relationships" xmlns:p14="http://schemas.microsoft.com/office/powerpoint/2010/main" xmlns:p15="http://schemas.microsoft.com/office/powerpoint/2012/main" xmlns:mc="http://schemas.openxmlformats.org/markup-compatibility/2006">
+  <p:cSld>
+    <p:spTree>
+      <p:nvGrpSpPr>
+        <p:cNvPr id="1" name=""/>
+        <p:cNvGrpSpPr/>
+        <p:nvPr/>
+      </p:nvGrpSpPr>
+      <p:grpSpPr>
+        <a:xfrm>
+          <a:off x="0" y="0"/>
+          <a:ext cx="0" cy="0"/>
+          <a:chOff x="0" y="0"/>
+          <a:chExt cx="0" cy="0"/>
+        </a:xfrm>
+      </p:grpSpPr>
+      <p:sp>
+        <p:nvSpPr>
+          <p:cNvPr id="116" name="CustomShape 1"/>
+          <p:cNvSpPr/>
+          <p:nvPr/>
+        </p:nvSpPr>
+        <p:spPr>
+          <a:xfrm>
+            <a:off x="488880" y="-87480"/>
+            <a:ext cx="8025120" cy="1324080"/>
+          </a:xfrm>
+          <a:prstGeom prst="rect">
+            <a:avLst/>
+          </a:prstGeom>
+          <a:noFill/>
+          <a:ln>
+            <a:noFill/>
+          </a:ln>
+        </p:spPr>
+        <p:style>
+          <a:lnRef idx="0"/>
+          <a:fillRef idx="0"/>
+          <a:effectRef idx="0"/>
+          <a:fontRef idx="minor"/>
+        </p:style>
+        <p:txBody>
+          <a:bodyPr lIns="90000" rIns="90000" tIns="45000" bIns="45000" anchor="ctr"/>
+          <a:p>
+            <a:pPr>
+              <a:lnSpc>
+                <a:spcPct val="90000"/>
+              </a:lnSpc>
+            </a:pPr>
+            <a:r>
+              <a:rPr b="1" lang="en-US" sz="3600" spc="-1" strike="noStrike">
+                <a:solidFill>
+                  <a:srgbClr val="ffffff"/>
+                </a:solidFill>
+                <a:latin typeface="Calibri"/>
+                <a:ea typeface="DejaVu Sans"/>
+              </a:rPr>
+              <a:t>4. Kết quả</a:t>
+            </a:r>
+            <a:endParaRPr b="0" lang="en-US" sz="3600" spc="-1" strike="noStrike">
+              <a:latin typeface="Arial"/>
+            </a:endParaRPr>
+          </a:p>
+        </p:txBody>
+      </p:sp>
+      <p:sp>
+        <p:nvSpPr>
+          <p:cNvPr id="117" name="CustomShape 2"/>
+          <p:cNvSpPr/>
+          <p:nvPr/>
+        </p:nvSpPr>
+        <p:spPr>
+          <a:xfrm>
+            <a:off x="604800" y="2440800"/>
+            <a:ext cx="6850440" cy="1936440"/>
+          </a:xfrm>
+          <a:prstGeom prst="rect">
+            <a:avLst/>
+          </a:prstGeom>
+          <a:noFill/>
+          <a:ln>
+            <a:noFill/>
+          </a:ln>
+        </p:spPr>
+        <p:style>
+          <a:lnRef idx="0"/>
+          <a:fillRef idx="0"/>
+          <a:effectRef idx="0"/>
+          <a:fontRef idx="minor"/>
+        </p:style>
+        <p:txBody>
+          <a:bodyPr lIns="90000" rIns="90000" tIns="45000" bIns="45000">
+            <a:normAutofit/>
+          </a:bodyPr>
+          <a:p>
+            <a:pPr>
+              <a:lnSpc>
+                <a:spcPct val="90000"/>
+              </a:lnSpc>
+              <a:spcBef>
+                <a:spcPts val="751"/>
+              </a:spcBef>
+            </a:pPr>
+            <a:r>
+              <a:rPr b="0" lang="en-US" sz="3200" spc="-1" strike="noStrike">
+                <a:solidFill>
+                  <a:srgbClr val="404040"/>
+                </a:solidFill>
+                <a:latin typeface="Calibri"/>
+                <a:ea typeface="DejaVu Sans"/>
+              </a:rPr>
+              <a:t>Bộ dữ liệu 100: Không xếp đc</a:t>
+            </a:r>
+            <a:endParaRPr b="0" lang="en-US" sz="3200" spc="-1" strike="noStrike">
+              <a:latin typeface="Arial"/>
+            </a:endParaRPr>
+          </a:p>
+          <a:p>
+            <a:pPr>
+              <a:lnSpc>
+                <a:spcPct val="90000"/>
+              </a:lnSpc>
+              <a:spcBef>
+                <a:spcPts val="751"/>
+              </a:spcBef>
+            </a:pPr>
+            <a:r>
+              <a:rPr b="0" lang="en-US" sz="3200" spc="-1" strike="noStrike">
+                <a:solidFill>
+                  <a:srgbClr val="404040"/>
+                </a:solidFill>
+                <a:latin typeface="Calibri"/>
+                <a:ea typeface="DejaVu Sans"/>
+              </a:rPr>
+              <a:t>Bộ dữ liệu 1000: xếp được 592 item</a:t>
+            </a:r>
+            <a:endParaRPr b="0" lang="en-US" sz="3200" spc="-1" strike="noStrike">
+              <a:latin typeface="Arial"/>
+            </a:endParaRPr>
+          </a:p>
+          <a:p>
+            <a:pPr>
+              <a:lnSpc>
+                <a:spcPct val="90000"/>
+              </a:lnSpc>
+              <a:spcBef>
+                <a:spcPts val="751"/>
+              </a:spcBef>
+            </a:pPr>
+            <a:r>
+              <a:rPr b="0" lang="en-US" sz="3200" spc="-1" strike="noStrike">
+                <a:solidFill>
+                  <a:srgbClr val="404040"/>
+                </a:solidFill>
+                <a:latin typeface="Calibri"/>
+                <a:ea typeface="DejaVu Sans"/>
+              </a:rPr>
+              <a:t>Bộ dữ liệu 3000: xếp được 2292 item</a:t>
+            </a:r>
+            <a:endParaRPr b="0" lang="en-US" sz="3200" spc="-1" strike="noStrike">
+              <a:latin typeface="Arial"/>
+            </a:endParaRPr>
+          </a:p>
+        </p:txBody>
+      </p:sp>
+    </p:spTree>
+  </p:cSld>
+  <p:timing>
+    <p:tnLst>
+      <p:par>
+        <p:cTn id="31" dur="indefinite" restart="never" nodeType="tmRoot">
+          <p:childTnLst>
+            <p:seq>
+              <p:cTn id="32" dur="indefinite" nodeType="mainSeq"/>
               <p:prevCondLst>
                 <p:cond delay="0" evt="onPrev">
                   <p:tgtEl>
@@ -4507,7 +5290,7 @@
         <p:spPr>
           <a:xfrm>
             <a:off x="488880" y="-87480"/>
-            <a:ext cx="8025840" cy="1324800"/>
+            <a:ext cx="8025120" cy="1324080"/>
           </a:xfrm>
           <a:prstGeom prst="rect">
             <a:avLst/>
@@ -4556,7 +5339,7 @@
         <p:spPr>
           <a:xfrm>
             <a:off x="488880" y="1346040"/>
-            <a:ext cx="8025840" cy="4901400"/>
+            <a:ext cx="8025120" cy="4900680"/>
           </a:xfrm>
           <a:prstGeom prst="rect">
             <a:avLst/>
@@ -4575,7 +5358,7 @@
         <p:txBody>
           <a:bodyPr lIns="90000" rIns="90000" tIns="45000" bIns="45000"/>
           <a:p>
-            <a:pPr marL="457200" indent="-456480">
+            <a:pPr marL="457200" indent="-455760">
               <a:lnSpc>
                 <a:spcPct val="90000"/>
               </a:lnSpc>
@@ -4603,7 +5386,7 @@
             </a:endParaRPr>
           </a:p>
           <a:p>
-            <a:pPr marL="457200" indent="-456480">
+            <a:pPr marL="457200" indent="-455760">
               <a:lnSpc>
                 <a:spcPct val="90000"/>
               </a:lnSpc>
@@ -4664,7 +5447,7 @@
             </a:endParaRPr>
           </a:p>
           <a:p>
-            <a:pPr>
+            <a:pPr marL="360">
               <a:lnSpc>
                 <a:spcPct val="90000"/>
               </a:lnSpc>
@@ -4697,7 +5480,7 @@
             </a:endParaRPr>
           </a:p>
           <a:p>
-            <a:pPr>
+            <a:pPr marL="360">
               <a:lnSpc>
                 <a:spcPct val="90000"/>
               </a:lnSpc>
@@ -4730,7 +5513,7 @@
             </a:endParaRPr>
           </a:p>
           <a:p>
-            <a:pPr>
+            <a:pPr marL="360">
               <a:lnSpc>
                 <a:spcPct val="90000"/>
               </a:lnSpc>
@@ -4753,7 +5536,7 @@
             </a:endParaRPr>
           </a:p>
           <a:p>
-            <a:pPr>
+            <a:pPr marL="360">
               <a:lnSpc>
                 <a:spcPct val="90000"/>
               </a:lnSpc>
@@ -4786,7 +5569,7 @@
             </a:endParaRPr>
           </a:p>
           <a:p>
-            <a:pPr>
+            <a:pPr marL="360">
               <a:lnSpc>
                 <a:spcPct val="90000"/>
               </a:lnSpc>
@@ -4819,7 +5602,7 @@
             </a:endParaRPr>
           </a:p>
           <a:p>
-            <a:pPr>
+            <a:pPr marL="360">
               <a:lnSpc>
                 <a:spcPct val="90000"/>
               </a:lnSpc>
@@ -4842,7 +5625,7 @@
             </a:endParaRPr>
           </a:p>
           <a:p>
-            <a:pPr>
+            <a:pPr marL="360">
               <a:lnSpc>
                 <a:spcPct val="90000"/>
               </a:lnSpc>
@@ -4914,7 +5697,7 @@
         <p:spPr>
           <a:xfrm>
             <a:off x="488880" y="-87480"/>
-            <a:ext cx="8025840" cy="1324800"/>
+            <a:ext cx="8025120" cy="1324080"/>
           </a:xfrm>
           <a:prstGeom prst="rect">
             <a:avLst/>
@@ -4963,7 +5746,7 @@
         <p:spPr>
           <a:xfrm>
             <a:off x="1230840" y="1237680"/>
-            <a:ext cx="4697640" cy="4895280"/>
+            <a:ext cx="4696920" cy="4894560"/>
           </a:xfrm>
           <a:prstGeom prst="rect">
             <a:avLst/>
@@ -4982,7 +5765,7 @@
         <p:txBody>
           <a:bodyPr lIns="90000" rIns="90000" tIns="45000" bIns="45000"/>
           <a:p>
-            <a:pPr marL="285840" indent="-285480">
+            <a:pPr marL="285840" indent="-284760">
               <a:lnSpc>
                 <a:spcPct val="100000"/>
               </a:lnSpc>
@@ -5010,7 +5793,7 @@
             </a:endParaRPr>
           </a:p>
           <a:p>
-            <a:pPr lvl="1" marL="743040" indent="-285480">
+            <a:pPr lvl="1" marL="743040" indent="-284760">
               <a:lnSpc>
                 <a:spcPct val="100000"/>
               </a:lnSpc>
@@ -5038,7 +5821,7 @@
             </a:endParaRPr>
           </a:p>
           <a:p>
-            <a:pPr lvl="1" marL="743040" indent="-285480">
+            <a:pPr lvl="1" marL="743040" indent="-284760">
               <a:lnSpc>
                 <a:spcPct val="100000"/>
               </a:lnSpc>
@@ -5066,7 +5849,7 @@
             </a:endParaRPr>
           </a:p>
           <a:p>
-            <a:pPr lvl="1" marL="743040" indent="-285480">
+            <a:pPr lvl="1" marL="743040" indent="-284760">
               <a:lnSpc>
                 <a:spcPct val="100000"/>
               </a:lnSpc>
@@ -5094,7 +5877,7 @@
             </a:endParaRPr>
           </a:p>
           <a:p>
-            <a:pPr lvl="1" marL="743040" indent="-285480">
+            <a:pPr lvl="1" marL="743040" indent="-284760">
               <a:lnSpc>
                 <a:spcPct val="100000"/>
               </a:lnSpc>
@@ -5122,7 +5905,7 @@
             </a:endParaRPr>
           </a:p>
           <a:p>
-            <a:pPr lvl="1" marL="743040" indent="-285480">
+            <a:pPr lvl="1" marL="743040" indent="-284760">
               <a:lnSpc>
                 <a:spcPct val="100000"/>
               </a:lnSpc>
@@ -5150,7 +5933,7 @@
             </a:endParaRPr>
           </a:p>
           <a:p>
-            <a:pPr lvl="1" marL="743040" indent="-285480">
+            <a:pPr lvl="1" marL="743040" indent="-284760">
               <a:lnSpc>
                 <a:spcPct val="100000"/>
               </a:lnSpc>
@@ -5178,7 +5961,7 @@
             </a:endParaRPr>
           </a:p>
           <a:p>
-            <a:pPr marL="285840" indent="-285480">
+            <a:pPr marL="285840" indent="-284760">
               <a:lnSpc>
                 <a:spcPct val="100000"/>
               </a:lnSpc>
@@ -5206,7 +5989,7 @@
             </a:endParaRPr>
           </a:p>
           <a:p>
-            <a:pPr lvl="1" marL="743040" indent="-285480">
+            <a:pPr lvl="1" marL="743040" indent="-284760">
               <a:lnSpc>
                 <a:spcPct val="100000"/>
               </a:lnSpc>
@@ -5234,7 +6017,7 @@
             </a:endParaRPr>
           </a:p>
           <a:p>
-            <a:pPr lvl="1" marL="743040" indent="-285480">
+            <a:pPr lvl="1" marL="743040" indent="-284760">
               <a:lnSpc>
                 <a:spcPct val="100000"/>
               </a:lnSpc>
@@ -5262,7 +6045,7 @@
             </a:endParaRPr>
           </a:p>
           <a:p>
-            <a:pPr lvl="1" marL="743040" indent="-285480">
+            <a:pPr lvl="1" marL="743040" indent="-284760">
               <a:lnSpc>
                 <a:spcPct val="100000"/>
               </a:lnSpc>
@@ -5290,7 +6073,7 @@
             </a:endParaRPr>
           </a:p>
           <a:p>
-            <a:pPr lvl="1" marL="743040" indent="-285480">
+            <a:pPr lvl="1" marL="743040" indent="-284760">
               <a:lnSpc>
                 <a:spcPct val="100000"/>
               </a:lnSpc>
@@ -5318,7 +6101,7 @@
             </a:endParaRPr>
           </a:p>
           <a:p>
-            <a:pPr lvl="1" marL="743040" indent="-285480">
+            <a:pPr lvl="1" marL="743040" indent="-284760">
               <a:lnSpc>
                 <a:spcPct val="100000"/>
               </a:lnSpc>
@@ -5402,7 +6185,7 @@
         <p:spPr>
           <a:xfrm>
             <a:off x="502920" y="-87480"/>
-            <a:ext cx="8025840" cy="1324800"/>
+            <a:ext cx="8025120" cy="1324080"/>
           </a:xfrm>
           <a:prstGeom prst="rect">
             <a:avLst/>
@@ -5451,7 +6234,7 @@
         <p:spPr>
           <a:xfrm>
             <a:off x="488880" y="1346040"/>
-            <a:ext cx="8025840" cy="4901400"/>
+            <a:ext cx="8025120" cy="4900680"/>
           </a:xfrm>
           <a:prstGeom prst="rect">
             <a:avLst/>
@@ -5493,7 +6276,7 @@
             </a:endParaRPr>
           </a:p>
           <a:p>
-            <a:pPr>
+            <a:pPr marL="360">
               <a:lnSpc>
                 <a:spcPct val="100000"/>
               </a:lnSpc>
@@ -5503,7 +6286,7 @@
             </a:endParaRPr>
           </a:p>
           <a:p>
-            <a:pPr>
+            <a:pPr marL="360">
               <a:lnSpc>
                 <a:spcPct val="100000"/>
               </a:lnSpc>
@@ -5513,7 +6296,7 @@
             </a:endParaRPr>
           </a:p>
           <a:p>
-            <a:pPr lvl="1" marL="743040" indent="-285480">
+            <a:pPr lvl="1" marL="743040" indent="-284760">
               <a:lnSpc>
                 <a:spcPct val="100000"/>
               </a:lnSpc>
@@ -5551,14 +6334,14 @@
                 <a:latin typeface="Arial"/>
                 <a:ea typeface="DejaVu Sans"/>
               </a:rPr>
-              <a:t>X[i] = b, b in D[i]: item i được xếp vào bin b</a:t>
+              <a:t>X[i] = b, b in binIndices[i]: item i được xếp vào bin b</a:t>
             </a:r>
             <a:endParaRPr b="0" lang="en-US" sz="2000" spc="-1" strike="noStrike">
               <a:latin typeface="Arial"/>
             </a:endParaRPr>
           </a:p>
           <a:p>
-            <a:pPr lvl="1" marL="743040" indent="-285480">
+            <a:pPr lvl="1" marL="743040" indent="-284760">
               <a:lnSpc>
                 <a:spcPct val="100000"/>
               </a:lnSpc>
@@ -5583,7 +6366,7 @@
             </a:endParaRPr>
           </a:p>
           <a:p>
-            <a:pPr lvl="2" marL="1200240" indent="-285480">
+            <a:pPr lvl="2" marL="1200240" indent="-284760">
               <a:lnSpc>
                 <a:spcPct val="100000"/>
               </a:lnSpc>
@@ -5608,7 +6391,7 @@
             </a:endParaRPr>
           </a:p>
           <a:p>
-            <a:pPr lvl="2" marL="1200240" indent="-285480">
+            <a:pPr lvl="2" marL="1200240" indent="-284760">
               <a:lnSpc>
                 <a:spcPct val="100000"/>
               </a:lnSpc>
@@ -5633,7 +6416,7 @@
             </a:endParaRPr>
           </a:p>
           <a:p>
-            <a:pPr lvl="2" marL="1200240" indent="-285480">
+            <a:pPr lvl="2" marL="1200240" indent="-284760">
               <a:lnSpc>
                 <a:spcPct val="100000"/>
               </a:lnSpc>
@@ -5651,14 +6434,14 @@
                 <a:latin typeface="Arial"/>
                 <a:ea typeface="DejaVu Sans"/>
               </a:rPr>
-              <a:t>len(set(t[i]) &lt;= T[b], với i: x[i] == b, b = 1, …, M</a:t>
+              <a:t>len(set(t[i])) &lt;= T[b], với i: x[i] == b, b = 1, …, M</a:t>
             </a:r>
             <a:endParaRPr b="0" lang="en-US" sz="2000" spc="-1" strike="noStrike">
               <a:latin typeface="Arial"/>
             </a:endParaRPr>
           </a:p>
           <a:p>
-            <a:pPr lvl="2" marL="1200240" indent="-285480">
+            <a:pPr lvl="2" marL="1200240" indent="-284760">
               <a:lnSpc>
                 <a:spcPct val="100000"/>
               </a:lnSpc>
@@ -5676,7 +6459,7 @@
                 <a:latin typeface="Arial"/>
                 <a:ea typeface="DejaVu Sans"/>
               </a:rPr>
-              <a:t>len(set(r[i]) &lt;= R[b], với i: x[i] == b, b = 1, …, M</a:t>
+              <a:t>len(set(r[i])) &lt;= R[b], với i: x[i] == b, b = 1, …, M</a:t>
             </a:r>
             <a:endParaRPr b="0" lang="en-US" sz="2000" spc="-1" strike="noStrike">
               <a:latin typeface="Arial"/>
@@ -5768,7 +6551,7 @@
         <p:spPr>
           <a:xfrm>
             <a:off x="334080" y="-186120"/>
-            <a:ext cx="8025840" cy="1324800"/>
+            <a:ext cx="8025120" cy="1324080"/>
           </a:xfrm>
           <a:prstGeom prst="rect">
             <a:avLst/>
@@ -5817,7 +6600,7 @@
         <p:spPr>
           <a:xfrm>
             <a:off x="488880" y="1359000"/>
-            <a:ext cx="8139240" cy="5498280"/>
+            <a:ext cx="8138520" cy="5497560"/>
           </a:xfrm>
           <a:prstGeom prst="rect">
             <a:avLst/>
@@ -5854,7 +6637,7 @@
                 <a:latin typeface="Times New Roman"/>
                 <a:ea typeface="DejaVu Sans"/>
               </a:rPr>
-              <a:t>Ý tưởng: Duyệt qua tất cả các Item và xếp vào bin đầu tiên thỏa mãn điều kiện:</a:t>
+              <a:t>Nhận thấy tất cả các bin đều có cận trên về số loại R là 1 nên ta gộp tất cả item theo cùng 1 loại r và tính tổng w theo r đó.</a:t>
             </a:r>
             <a:endParaRPr b="0" lang="en-US" sz="2400" spc="-1" strike="noStrike">
               <a:latin typeface="Arial"/>
@@ -5869,20 +6652,28 @@
                 <a:spcPts val="751"/>
               </a:spcBef>
             </a:pPr>
+            <a:r>
+              <a:rPr b="0" lang="en-US" sz="2400" spc="-1" strike="noStrike">
+                <a:solidFill>
+                  <a:srgbClr val="000000"/>
+                </a:solidFill>
+                <a:latin typeface="Times New Roman"/>
+                <a:ea typeface="DejaVu Sans"/>
+              </a:rPr>
+              <a:t>Lưu lại giá trị tổng w theo r mà tổng này là lớn nhất.</a:t>
+            </a:r>
             <a:endParaRPr b="0" lang="en-US" sz="2400" spc="-1" strike="noStrike">
               <a:latin typeface="Arial"/>
             </a:endParaRPr>
           </a:p>
           <a:p>
-            <a:pPr lvl="2" marL="1200240" indent="-285480">
-              <a:lnSpc>
-                <a:spcPct val="100000"/>
-              </a:lnSpc>
-              <a:buClr>
-                <a:srgbClr val="000000"/>
-              </a:buClr>
-              <a:buFont typeface="Arial"/>
-              <a:buChar char="•"/>
+            <a:pPr>
+              <a:lnSpc>
+                <a:spcPct val="90000"/>
+              </a:lnSpc>
+              <a:spcBef>
+                <a:spcPts val="751"/>
+              </a:spcBef>
             </a:pPr>
             <a:r>
               <a:rPr b="0" lang="en-US" sz="2400" spc="-1" strike="noStrike">
@@ -5892,22 +6683,20 @@
                 <a:latin typeface="Times New Roman"/>
                 <a:ea typeface="DejaVu Sans"/>
               </a:rPr>
-              <a:t>sum (w[i]) &lt;= W[b], với i: x[i] == b, b = 1, …, M</a:t>
+              <a:t>Duyệt qua tất cả các bin rồi so sánh LW với giá trị tổng lớn nhất này. Nếu nó lớn hơn thì loại bỏ luôn bin này.</a:t>
             </a:r>
             <a:endParaRPr b="0" lang="en-US" sz="2400" spc="-1" strike="noStrike">
               <a:latin typeface="Arial"/>
             </a:endParaRPr>
           </a:p>
           <a:p>
-            <a:pPr lvl="2" marL="1200240" indent="-285480">
-              <a:lnSpc>
-                <a:spcPct val="100000"/>
-              </a:lnSpc>
-              <a:buClr>
-                <a:srgbClr val="000000"/>
-              </a:buClr>
-              <a:buFont typeface="Arial"/>
-              <a:buChar char="•"/>
+            <a:pPr>
+              <a:lnSpc>
+                <a:spcPct val="90000"/>
+              </a:lnSpc>
+              <a:spcBef>
+                <a:spcPts val="751"/>
+              </a:spcBef>
             </a:pPr>
             <a:r>
               <a:rPr b="0" lang="en-US" sz="2400" spc="-1" strike="noStrike">
@@ -5917,22 +6706,20 @@
                 <a:latin typeface="Times New Roman"/>
                 <a:ea typeface="DejaVu Sans"/>
               </a:rPr>
-              <a:t>sum(p[i]) &lt;= P[b], với i: x[i] == b, b = 1, …, M</a:t>
+              <a:t>Kết quả:</a:t>
             </a:r>
             <a:endParaRPr b="0" lang="en-US" sz="2400" spc="-1" strike="noStrike">
               <a:latin typeface="Arial"/>
             </a:endParaRPr>
           </a:p>
           <a:p>
-            <a:pPr lvl="2" marL="1200240" indent="-285480">
-              <a:lnSpc>
-                <a:spcPct val="100000"/>
-              </a:lnSpc>
-              <a:buClr>
-                <a:srgbClr val="000000"/>
-              </a:buClr>
-              <a:buFont typeface="Arial"/>
-              <a:buChar char="•"/>
+            <a:pPr>
+              <a:lnSpc>
+                <a:spcPct val="90000"/>
+              </a:lnSpc>
+              <a:spcBef>
+                <a:spcPts val="751"/>
+              </a:spcBef>
             </a:pPr>
             <a:r>
               <a:rPr b="0" lang="en-US" sz="2400" spc="-1" strike="noStrike">
@@ -5942,22 +6729,20 @@
                 <a:latin typeface="Times New Roman"/>
                 <a:ea typeface="DejaVu Sans"/>
               </a:rPr>
-              <a:t>len(set(t[i]) &lt;= T[b], với i: x[i] == b, b = 1, …, M</a:t>
+              <a:t>Bộ 1000: Loại 797 bin</a:t>
             </a:r>
             <a:endParaRPr b="0" lang="en-US" sz="2400" spc="-1" strike="noStrike">
               <a:latin typeface="Arial"/>
             </a:endParaRPr>
           </a:p>
           <a:p>
-            <a:pPr lvl="2" marL="1200240" indent="-285480">
-              <a:lnSpc>
-                <a:spcPct val="100000"/>
-              </a:lnSpc>
-              <a:buClr>
-                <a:srgbClr val="000000"/>
-              </a:buClr>
-              <a:buFont typeface="Arial"/>
-              <a:buChar char="•"/>
+            <a:pPr>
+              <a:lnSpc>
+                <a:spcPct val="90000"/>
+              </a:lnSpc>
+              <a:spcBef>
+                <a:spcPts val="751"/>
+              </a:spcBef>
             </a:pPr>
             <a:r>
               <a:rPr b="0" lang="en-US" sz="2400" spc="-1" strike="noStrike">
@@ -5967,80 +6752,8 @@
                 <a:latin typeface="Times New Roman"/>
                 <a:ea typeface="DejaVu Sans"/>
               </a:rPr>
-              <a:t>len(set(r[i]) &lt;= R[b], với i: x[i] == b, b = 1, …, M</a:t>
-            </a:r>
-            <a:endParaRPr b="0" lang="en-US" sz="2400" spc="-1" strike="noStrike">
-              <a:latin typeface="Arial"/>
-            </a:endParaRPr>
-          </a:p>
-          <a:p>
-            <a:pPr>
-              <a:lnSpc>
-                <a:spcPct val="90000"/>
-              </a:lnSpc>
-              <a:spcBef>
-                <a:spcPts val="751"/>
-              </a:spcBef>
-            </a:pPr>
-            <a:endParaRPr b="0" lang="en-US" sz="2400" spc="-1" strike="noStrike">
-              <a:latin typeface="Arial"/>
-            </a:endParaRPr>
-          </a:p>
-          <a:p>
-            <a:pPr>
-              <a:lnSpc>
-                <a:spcPct val="90000"/>
-              </a:lnSpc>
-              <a:spcBef>
-                <a:spcPts val="751"/>
-              </a:spcBef>
-            </a:pPr>
-            <a:r>
-              <a:rPr b="0" lang="en-US" sz="2400" spc="-1" strike="noStrike">
-                <a:solidFill>
-                  <a:srgbClr val="000000"/>
-                </a:solidFill>
-                <a:latin typeface="Times New Roman"/>
-                <a:ea typeface="DejaVu Sans"/>
-              </a:rPr>
-              <a:t> </a:t>
-            </a:r>
-            <a:r>
-              <a:rPr b="0" lang="en-US" sz="2400" spc="-1" strike="noStrike">
-                <a:solidFill>
-                  <a:srgbClr val="000000"/>
-                </a:solidFill>
-                <a:latin typeface="Times New Roman"/>
-                <a:ea typeface="DejaVu Sans"/>
-              </a:rPr>
-              <a:t>trong tập binIndices của item đó </a:t>
-            </a:r>
-            <a:endParaRPr b="0" lang="en-US" sz="2400" spc="-1" strike="noStrike">
-              <a:latin typeface="Arial"/>
-            </a:endParaRPr>
-          </a:p>
-          <a:p>
-            <a:pPr>
-              <a:lnSpc>
-                <a:spcPct val="90000"/>
-              </a:lnSpc>
-              <a:spcBef>
-                <a:spcPts val="751"/>
-              </a:spcBef>
-            </a:pPr>
-            <a:endParaRPr b="0" lang="en-US" sz="2400" spc="-1" strike="noStrike">
-              <a:latin typeface="Arial"/>
-            </a:endParaRPr>
-          </a:p>
-          <a:p>
-            <a:pPr>
-              <a:lnSpc>
-                <a:spcPct val="90000"/>
-              </a:lnSpc>
-              <a:spcBef>
-                <a:spcPts val="751"/>
-              </a:spcBef>
-            </a:pPr>
+              <a:t>Bộ 3000: Loại 274 bin</a:t>
+            </a:r>
             <a:endParaRPr b="0" lang="en-US" sz="2400" spc="-1" strike="noStrike">
               <a:latin typeface="Arial"/>
             </a:endParaRPr>
@@ -6104,8 +6817,8 @@
         </p:nvSpPr>
         <p:spPr>
           <a:xfrm>
-            <a:off x="488880" y="-87480"/>
-            <a:ext cx="8025840" cy="1324800"/>
+            <a:off x="334080" y="-186120"/>
+            <a:ext cx="8025120" cy="1324080"/>
           </a:xfrm>
           <a:prstGeom prst="rect">
             <a:avLst/>
@@ -6122,16 +6835,13 @@
           <a:fontRef idx="minor"/>
         </p:style>
         <p:txBody>
-          <a:bodyPr lIns="90000" rIns="90000" tIns="45000" bIns="45000" anchor="ctr">
-            <a:normAutofit/>
-          </a:bodyPr>
+          <a:bodyPr lIns="90000" rIns="90000" tIns="45000" bIns="45000" anchor="ctr"/>
           <a:p>
             <a:pPr>
               <a:lnSpc>
                 <a:spcPct val="90000"/>
               </a:lnSpc>
             </a:pPr>
-            <a:br/>
             <a:r>
               <a:rPr b="1" lang="en-US" sz="3600" spc="-1" strike="noStrike">
                 <a:solidFill>
@@ -6140,9 +6850,8 @@
                 <a:latin typeface="Calibri"/>
                 <a:ea typeface="DejaVu Sans"/>
               </a:rPr>
-              <a:t>2.3. Thuật toán tìm kiếm</a:t>
-            </a:r>
-            <a:br/>
+              <a:t>2.2. Khởi tạo</a:t>
+            </a:r>
             <a:endParaRPr b="0" lang="en-US" sz="3600" spc="-1" strike="noStrike">
               <a:latin typeface="Arial"/>
             </a:endParaRPr>
@@ -6157,8 +6866,8 @@
         </p:nvSpPr>
         <p:spPr>
           <a:xfrm>
-            <a:off x="488880" y="1346040"/>
-            <a:ext cx="8025840" cy="4901400"/>
+            <a:off x="488880" y="1359000"/>
+            <a:ext cx="8138520" cy="5497560"/>
           </a:xfrm>
           <a:prstGeom prst="rect">
             <a:avLst/>
@@ -6175,7 +6884,9 @@
           <a:fontRef idx="minor"/>
         </p:style>
         <p:txBody>
-          <a:bodyPr lIns="90000" rIns="90000" tIns="45000" bIns="45000"/>
+          <a:bodyPr lIns="90000" rIns="90000" tIns="45000" bIns="45000">
+            <a:normAutofit/>
+          </a:bodyPr>
           <a:p>
             <a:pPr>
               <a:lnSpc>
@@ -6185,7 +6896,17 @@
                 <a:spcPts val="751"/>
               </a:spcBef>
             </a:pPr>
-            <a:endParaRPr b="0" lang="en-US" sz="1800" spc="-1" strike="noStrike">
+            <a:r>
+              <a:rPr b="0" lang="en-US" sz="2400" spc="-1" strike="noStrike">
+                <a:solidFill>
+                  <a:srgbClr val="000000"/>
+                </a:solidFill>
+                <a:latin typeface="Times New Roman"/>
+                <a:ea typeface="DejaVu Sans"/>
+              </a:rPr>
+              <a:t>Ý tưởng: Duyệt qua tất cả các Item và xếp vào bin đầu tiên thỏa mãn điều kiện:</a:t>
+            </a:r>
+            <a:endParaRPr b="0" lang="en-US" sz="2400" spc="-1" strike="noStrike">
               <a:latin typeface="Arial"/>
             </a:endParaRPr>
           </a:p>
@@ -6198,17 +6919,107 @@
                 <a:spcPts val="751"/>
               </a:spcBef>
             </a:pPr>
-            <a:r>
-              <a:rPr b="0" lang="en-US" sz="2800" spc="-1" strike="noStrike">
-                <a:solidFill>
-                  <a:srgbClr val="404040"/>
-                </a:solidFill>
-                <a:latin typeface="Calibri"/>
-                <a:ea typeface="DejaVu Sans"/>
-              </a:rPr>
-              <a:t>Sử dụng thuật toán Hill-Climbing:</a:t>
-            </a:r>
-            <a:endParaRPr b="0" lang="en-US" sz="2800" spc="-1" strike="noStrike">
+            <a:endParaRPr b="0" lang="en-US" sz="2400" spc="-1" strike="noStrike">
+              <a:latin typeface="Arial"/>
+            </a:endParaRPr>
+          </a:p>
+          <a:p>
+            <a:pPr lvl="2" marL="1200240" indent="-284760">
+              <a:lnSpc>
+                <a:spcPct val="100000"/>
+              </a:lnSpc>
+              <a:buClr>
+                <a:srgbClr val="000000"/>
+              </a:buClr>
+              <a:buFont typeface="Arial"/>
+              <a:buChar char="•"/>
+            </a:pPr>
+            <a:r>
+              <a:rPr b="0" lang="en-US" sz="2400" spc="-1" strike="noStrike">
+                <a:solidFill>
+                  <a:srgbClr val="000000"/>
+                </a:solidFill>
+                <a:latin typeface="Times New Roman"/>
+                <a:ea typeface="DejaVu Sans"/>
+              </a:rPr>
+              <a:t>sum (w[i]) &lt;= W[b], với i: x[i] == b, b = 1, …, M</a:t>
+            </a:r>
+            <a:endParaRPr b="0" lang="en-US" sz="2400" spc="-1" strike="noStrike">
+              <a:latin typeface="Arial"/>
+            </a:endParaRPr>
+          </a:p>
+          <a:p>
+            <a:pPr lvl="2" marL="1200240" indent="-284760">
+              <a:lnSpc>
+                <a:spcPct val="100000"/>
+              </a:lnSpc>
+              <a:buClr>
+                <a:srgbClr val="000000"/>
+              </a:buClr>
+              <a:buFont typeface="Arial"/>
+              <a:buChar char="•"/>
+            </a:pPr>
+            <a:r>
+              <a:rPr b="0" lang="en-US" sz="2400" spc="-1" strike="noStrike">
+                <a:solidFill>
+                  <a:srgbClr val="000000"/>
+                </a:solidFill>
+                <a:latin typeface="Times New Roman"/>
+                <a:ea typeface="DejaVu Sans"/>
+              </a:rPr>
+              <a:t>sum(p[i]) &lt;= P[b], với i: x[i] == b, b = 1, …, M</a:t>
+            </a:r>
+            <a:endParaRPr b="0" lang="en-US" sz="2400" spc="-1" strike="noStrike">
+              <a:latin typeface="Arial"/>
+            </a:endParaRPr>
+          </a:p>
+          <a:p>
+            <a:pPr lvl="2" marL="1200240" indent="-284760">
+              <a:lnSpc>
+                <a:spcPct val="100000"/>
+              </a:lnSpc>
+              <a:buClr>
+                <a:srgbClr val="000000"/>
+              </a:buClr>
+              <a:buFont typeface="Arial"/>
+              <a:buChar char="•"/>
+            </a:pPr>
+            <a:r>
+              <a:rPr b="0" lang="en-US" sz="2400" spc="-1" strike="noStrike">
+                <a:solidFill>
+                  <a:srgbClr val="000000"/>
+                </a:solidFill>
+                <a:latin typeface="Times New Roman"/>
+                <a:ea typeface="DejaVu Sans"/>
+              </a:rPr>
+              <a:t>len(set(t[i])) &lt;= T[b], với i: x[i] == b, b = 1, …, M</a:t>
+            </a:r>
+            <a:endParaRPr b="0" lang="en-US" sz="2400" spc="-1" strike="noStrike">
+              <a:latin typeface="Arial"/>
+            </a:endParaRPr>
+          </a:p>
+          <a:p>
+            <a:pPr lvl="2" marL="1200240" indent="-284760">
+              <a:lnSpc>
+                <a:spcPct val="100000"/>
+              </a:lnSpc>
+              <a:buClr>
+                <a:srgbClr val="000000"/>
+              </a:buClr>
+              <a:buFont typeface="Arial"/>
+              <a:buChar char="•"/>
+            </a:pPr>
+            <a:r>
+              <a:rPr b="0" lang="en-US" sz="2400" spc="-1" strike="noStrike">
+                <a:solidFill>
+                  <a:srgbClr val="000000"/>
+                </a:solidFill>
+                <a:latin typeface="Times New Roman"/>
+                <a:ea typeface="DejaVu Sans"/>
+              </a:rPr>
+              <a:t>len(set(r[i])) &lt;= R[b], với i: x[i] == b, b = 1, …, M</a:t>
+            </a:r>
+            <a:endParaRPr b="0" lang="en-US" sz="2400" spc="-1" strike="noStrike">
               <a:latin typeface="Arial"/>
             </a:endParaRPr>
           </a:p>
@@ -6221,7 +7032,7 @@
                 <a:spcPts val="751"/>
               </a:spcBef>
             </a:pPr>
-            <a:endParaRPr b="0" lang="en-US" sz="2800" spc="-1" strike="noStrike">
+            <a:endParaRPr b="0" lang="en-US" sz="2400" spc="-1" strike="noStrike">
               <a:latin typeface="Arial"/>
             </a:endParaRPr>
           </a:p>
@@ -6235,16 +7046,26 @@
               </a:spcBef>
             </a:pPr>
             <a:r>
-              <a:rPr b="0" lang="en-US" sz="2200" spc="-1" strike="noStrike">
-                <a:solidFill>
-                  <a:srgbClr val="404040"/>
-                </a:solidFill>
-                <a:latin typeface="Calibri"/>
-                <a:ea typeface="DejaVu Sans"/>
-              </a:rPr>
-              <a:t>- Là một kỹ thuật tối ưu thuộc họ tìm kiếm cục bộ</a:t>
-            </a:r>
-            <a:endParaRPr b="0" lang="en-US" sz="2200" spc="-1" strike="noStrike">
+              <a:rPr b="0" lang="en-US" sz="2400" spc="-1" strike="noStrike">
+                <a:solidFill>
+                  <a:srgbClr val="000000"/>
+                </a:solidFill>
+                <a:latin typeface="Times New Roman"/>
+                <a:ea typeface="DejaVu Sans"/>
+              </a:rPr>
+              <a:t> </a:t>
+            </a:r>
+            <a:r>
+              <a:rPr b="0" lang="en-US" sz="2400" spc="-1" strike="noStrike">
+                <a:solidFill>
+                  <a:srgbClr val="000000"/>
+                </a:solidFill>
+                <a:latin typeface="Times New Roman"/>
+                <a:ea typeface="DejaVu Sans"/>
+              </a:rPr>
+              <a:t>trong tập binIndices của item đó </a:t>
+            </a:r>
+            <a:endParaRPr b="0" lang="en-US" sz="2400" spc="-1" strike="noStrike">
               <a:latin typeface="Arial"/>
             </a:endParaRPr>
           </a:p>
@@ -6257,17 +7078,20 @@
                 <a:spcPts val="751"/>
               </a:spcBef>
             </a:pPr>
-            <a:r>
-              <a:rPr b="0" lang="en-US" sz="2200" spc="-1" strike="noStrike">
-                <a:solidFill>
-                  <a:srgbClr val="404040"/>
-                </a:solidFill>
-                <a:latin typeface="Calibri"/>
-                <a:ea typeface="DejaVu Sans"/>
-              </a:rPr>
-              <a:t>- Ở trạng thái hiện tại, ta xem trạng thái tiếp theo nào tốt nhất thì ta sẽ đi theo trạng thái đó.</a:t>
-            </a:r>
-            <a:endParaRPr b="0" lang="en-US" sz="2200" spc="-1" strike="noStrike">
+            <a:endParaRPr b="0" lang="en-US" sz="2400" spc="-1" strike="noStrike">
+              <a:latin typeface="Arial"/>
+            </a:endParaRPr>
+          </a:p>
+          <a:p>
+            <a:pPr>
+              <a:lnSpc>
+                <a:spcPct val="90000"/>
+              </a:lnSpc>
+              <a:spcBef>
+                <a:spcPts val="751"/>
+              </a:spcBef>
+            </a:pPr>
+            <a:endParaRPr b="0" lang="en-US" sz="2400" spc="-1" strike="noStrike">
               <a:latin typeface="Arial"/>
             </a:endParaRPr>
           </a:p>
@@ -6330,8 +7154,8 @@
         </p:nvSpPr>
         <p:spPr>
           <a:xfrm>
-            <a:off x="488880" y="-87480"/>
-            <a:ext cx="8025840" cy="1324800"/>
+            <a:off x="334080" y="-186120"/>
+            <a:ext cx="8025120" cy="1324080"/>
           </a:xfrm>
           <a:prstGeom prst="rect">
             <a:avLst/>
@@ -6348,16 +7172,13 @@
           <a:fontRef idx="minor"/>
         </p:style>
         <p:txBody>
-          <a:bodyPr lIns="90000" rIns="90000" tIns="45000" bIns="45000" anchor="ctr">
-            <a:normAutofit/>
-          </a:bodyPr>
+          <a:bodyPr lIns="90000" rIns="90000" tIns="45000" bIns="45000" anchor="ctr"/>
           <a:p>
             <a:pPr>
               <a:lnSpc>
                 <a:spcPct val="90000"/>
               </a:lnSpc>
             </a:pPr>
-            <a:br/>
             <a:r>
               <a:rPr b="1" lang="en-US" sz="3600" spc="-1" strike="noStrike">
                 <a:solidFill>
@@ -6366,9 +7187,8 @@
                 <a:latin typeface="Calibri"/>
                 <a:ea typeface="DejaVu Sans"/>
               </a:rPr>
-              <a:t>2.3. Thuật toán tìm kiếm</a:t>
-            </a:r>
-            <a:br/>
+              <a:t>2.2. Khởi tạo</a:t>
+            </a:r>
             <a:endParaRPr b="0" lang="en-US" sz="3600" spc="-1" strike="noStrike">
               <a:latin typeface="Arial"/>
             </a:endParaRPr>
@@ -6383,8 +7203,8 @@
         </p:nvSpPr>
         <p:spPr>
           <a:xfrm>
-            <a:off x="488880" y="1346040"/>
-            <a:ext cx="8025840" cy="4901400"/>
+            <a:off x="488880" y="1359000"/>
+            <a:ext cx="8138520" cy="5497560"/>
           </a:xfrm>
           <a:prstGeom prst="rect">
             <a:avLst/>
@@ -6401,7 +7221,9 @@
           <a:fontRef idx="minor"/>
         </p:style>
         <p:txBody>
-          <a:bodyPr lIns="90000" rIns="90000" tIns="45000" bIns="45000"/>
+          <a:bodyPr lIns="90000" rIns="90000" tIns="45000" bIns="45000">
+            <a:normAutofit/>
+          </a:bodyPr>
           <a:p>
             <a:pPr>
               <a:lnSpc>
@@ -6411,7 +7233,17 @@
                 <a:spcPts val="751"/>
               </a:spcBef>
             </a:pPr>
-            <a:endParaRPr b="0" lang="en-US" sz="1800" spc="-1" strike="noStrike">
+            <a:r>
+              <a:rPr b="0" lang="en-US" sz="2400" spc="-1" strike="noStrike">
+                <a:solidFill>
+                  <a:srgbClr val="000000"/>
+                </a:solidFill>
+                <a:latin typeface="Times New Roman"/>
+                <a:ea typeface="DejaVu Sans"/>
+              </a:rPr>
+              <a:t>Hàm tính violations:</a:t>
+            </a:r>
+            <a:endParaRPr b="0" lang="en-US" sz="2400" spc="-1" strike="noStrike">
               <a:latin typeface="Arial"/>
             </a:endParaRPr>
           </a:p>
@@ -6424,61 +7256,120 @@
                 <a:spcPts val="751"/>
               </a:spcBef>
             </a:pPr>
-            <a:endParaRPr b="0" lang="en-US" sz="1800" spc="-1" strike="noStrike">
-              <a:latin typeface="Arial"/>
-            </a:endParaRPr>
-          </a:p>
-          <a:p>
-            <a:pPr marL="343080" indent="-342720">
+            <a:r>
+              <a:rPr b="0" lang="en-US" sz="2400" spc="-1" strike="noStrike">
+                <a:solidFill>
+                  <a:srgbClr val="000000"/>
+                </a:solidFill>
+                <a:latin typeface="Times New Roman"/>
+                <a:ea typeface="DejaVu Sans"/>
+              </a:rPr>
+              <a:t>Violations = violationW + violationP + violationT + violationR</a:t>
+            </a:r>
+            <a:endParaRPr b="0" lang="en-US" sz="2400" spc="-1" strike="noStrike">
+              <a:latin typeface="Arial"/>
+            </a:endParaRPr>
+          </a:p>
+          <a:p>
+            <a:pPr>
               <a:lnSpc>
                 <a:spcPct val="90000"/>
               </a:lnSpc>
               <a:spcBef>
                 <a:spcPts val="751"/>
               </a:spcBef>
-              <a:buClr>
-                <a:srgbClr val="404040"/>
-              </a:buClr>
-              <a:buFont typeface="StarSymbol"/>
-              <a:buChar char="-"/>
+            </a:pPr>
+            <a:endParaRPr b="0" lang="en-US" sz="2400" spc="-1" strike="noStrike">
+              <a:latin typeface="Arial"/>
+            </a:endParaRPr>
+          </a:p>
+          <a:p>
+            <a:pPr>
+              <a:lnSpc>
+                <a:spcPct val="90000"/>
+              </a:lnSpc>
+              <a:spcBef>
+                <a:spcPts val="751"/>
+              </a:spcBef>
             </a:pPr>
             <a:r>
               <a:rPr b="0" lang="en-US" sz="2400" spc="-1" strike="noStrike">
                 <a:solidFill>
-                  <a:srgbClr val="404040"/>
-                </a:solidFill>
-                <a:latin typeface="Calibri"/>
-                <a:ea typeface="DejaVu Sans"/>
-              </a:rPr>
-              <a:t>Hàm Violation(): trả về số vi phạm </a:t>
+                  <a:srgbClr val="000000"/>
+                </a:solidFill>
+                <a:latin typeface="Times New Roman"/>
+                <a:ea typeface="DejaVu Sans"/>
+              </a:rPr>
+              <a:t>ViolationW = (sumW[i] &gt; W[i]) ? 1 : 0</a:t>
             </a:r>
             <a:endParaRPr b="0" lang="en-US" sz="2400" spc="-1" strike="noStrike">
               <a:latin typeface="Arial"/>
             </a:endParaRPr>
           </a:p>
           <a:p>
-            <a:pPr marL="343080" indent="-342720">
+            <a:pPr>
               <a:lnSpc>
                 <a:spcPct val="90000"/>
               </a:lnSpc>
               <a:spcBef>
                 <a:spcPts val="751"/>
               </a:spcBef>
-              <a:buClr>
-                <a:srgbClr val="404040"/>
-              </a:buClr>
-              <a:buFont typeface="StarSymbol"/>
-              <a:buChar char="-"/>
             </a:pPr>
             <a:r>
               <a:rPr b="0" lang="en-US" sz="2400" spc="-1" strike="noStrike">
                 <a:solidFill>
-                  <a:srgbClr val="404040"/>
-                </a:solidFill>
-                <a:latin typeface="Calibri"/>
-                <a:ea typeface="DejaVu Sans"/>
-              </a:rPr>
-              <a:t>Hàm getAssignDelta( idx, bin): trả về lượng thay đổi vi phạm khi thay đổi giá trị tại vị trí idx bằng bin </a:t>
+                  <a:srgbClr val="000000"/>
+                </a:solidFill>
+                <a:latin typeface="Times New Roman"/>
+                <a:ea typeface="DejaVu Sans"/>
+              </a:rPr>
+              <a:t>ViolationP = (sumP[i] &gt; P[i]) ? 1 : 0</a:t>
+            </a:r>
+            <a:endParaRPr b="0" lang="en-US" sz="2400" spc="-1" strike="noStrike">
+              <a:latin typeface="Arial"/>
+            </a:endParaRPr>
+          </a:p>
+          <a:p>
+            <a:pPr>
+              <a:lnSpc>
+                <a:spcPct val="90000"/>
+              </a:lnSpc>
+              <a:spcBef>
+                <a:spcPts val="751"/>
+              </a:spcBef>
+            </a:pPr>
+            <a:r>
+              <a:rPr b="0" lang="en-US" sz="2400" spc="-1" strike="noStrike">
+                <a:solidFill>
+                  <a:srgbClr val="000000"/>
+                </a:solidFill>
+                <a:latin typeface="Times New Roman"/>
+                <a:ea typeface="DejaVu Sans"/>
+              </a:rPr>
+              <a:t>ViolationT = (sumT[i] &gt; T[i]) ? 1 : 0</a:t>
+            </a:r>
+            <a:endParaRPr b="0" lang="en-US" sz="2400" spc="-1" strike="noStrike">
+              <a:latin typeface="Arial"/>
+            </a:endParaRPr>
+          </a:p>
+          <a:p>
+            <a:pPr>
+              <a:lnSpc>
+                <a:spcPct val="90000"/>
+              </a:lnSpc>
+              <a:spcBef>
+                <a:spcPts val="751"/>
+              </a:spcBef>
+            </a:pPr>
+            <a:r>
+              <a:rPr b="0" lang="en-US" sz="2400" spc="-1" strike="noStrike">
+                <a:solidFill>
+                  <a:srgbClr val="000000"/>
+                </a:solidFill>
+                <a:latin typeface="Times New Roman"/>
+                <a:ea typeface="DejaVu Sans"/>
+              </a:rPr>
+              <a:t>ViolationR = (sumR[i] &gt; R[i]) ? 1 : 0</a:t>
             </a:r>
             <a:endParaRPr b="0" lang="en-US" sz="2400" spc="-1" strike="noStrike">
               <a:latin typeface="Arial"/>
@@ -6543,8 +7434,8 @@
         </p:nvSpPr>
         <p:spPr>
           <a:xfrm>
-            <a:off x="398880" y="-151560"/>
-            <a:ext cx="8025840" cy="1324800"/>
+            <a:off x="488880" y="-87480"/>
+            <a:ext cx="8025120" cy="1324080"/>
           </a:xfrm>
           <a:prstGeom prst="rect">
             <a:avLst/>
@@ -6561,13 +7452,16 @@
           <a:fontRef idx="minor"/>
         </p:style>
         <p:txBody>
-          <a:bodyPr lIns="90000" rIns="90000" tIns="45000" bIns="45000" anchor="ctr"/>
+          <a:bodyPr lIns="90000" rIns="90000" tIns="45000" bIns="45000" anchor="ctr">
+            <a:normAutofit/>
+          </a:bodyPr>
           <a:p>
             <a:pPr>
               <a:lnSpc>
                 <a:spcPct val="90000"/>
               </a:lnSpc>
             </a:pPr>
+            <a:br/>
             <a:r>
               <a:rPr b="1" lang="en-US" sz="3600" spc="-1" strike="noStrike">
                 <a:solidFill>
@@ -6576,8 +7470,9 @@
                 <a:latin typeface="Calibri"/>
                 <a:ea typeface="DejaVu Sans"/>
               </a:rPr>
-              <a:t>3. Genetic Algorithm</a:t>
-            </a:r>
+              <a:t>2.3. Thuật toán tìm kiếm</a:t>
+            </a:r>
+            <a:br/>
             <a:endParaRPr b="0" lang="en-US" sz="3600" spc="-1" strike="noStrike">
               <a:latin typeface="Arial"/>
             </a:endParaRPr>
@@ -6592,8 +7487,8 @@
         </p:nvSpPr>
         <p:spPr>
           <a:xfrm>
-            <a:off x="398880" y="1269000"/>
-            <a:ext cx="8177760" cy="4834800"/>
+            <a:off x="488880" y="1346040"/>
+            <a:ext cx="8025120" cy="4900680"/>
           </a:xfrm>
           <a:prstGeom prst="rect">
             <a:avLst/>
@@ -6610,9 +7505,7 @@
           <a:fontRef idx="minor"/>
         </p:style>
         <p:txBody>
-          <a:bodyPr lIns="90000" rIns="90000" tIns="45000" bIns="45000">
-            <a:normAutofit/>
-          </a:bodyPr>
+          <a:bodyPr lIns="90000" rIns="90000" tIns="45000" bIns="45000"/>
           <a:p>
             <a:pPr>
               <a:lnSpc>
@@ -6622,6 +7515,19 @@
                 <a:spcPts val="751"/>
               </a:spcBef>
             </a:pPr>
+            <a:endParaRPr b="0" lang="en-US" sz="1800" spc="-1" strike="noStrike">
+              <a:latin typeface="Arial"/>
+            </a:endParaRPr>
+          </a:p>
+          <a:p>
+            <a:pPr>
+              <a:lnSpc>
+                <a:spcPct val="90000"/>
+              </a:lnSpc>
+              <a:spcBef>
+                <a:spcPts val="751"/>
+              </a:spcBef>
+            </a:pPr>
             <a:r>
               <a:rPr b="0" lang="en-US" sz="2800" spc="-1" strike="noStrike">
                 <a:solidFill>
@@ -6630,7 +7536,7 @@
                 <a:latin typeface="Calibri"/>
                 <a:ea typeface="DejaVu Sans"/>
               </a:rPr>
-              <a:t>3.1. Khởi tạo</a:t>
+              <a:t>Sử dụng thuật toán Hill-Climbing:</a:t>
             </a:r>
             <a:endParaRPr b="0" lang="en-US" sz="2800" spc="-1" strike="noStrike">
               <a:latin typeface="Arial"/>
@@ -6650,30 +7556,25 @@
             </a:endParaRPr>
           </a:p>
           <a:p>
-            <a:pPr marL="457200" indent="-456840">
+            <a:pPr>
               <a:lnSpc>
                 <a:spcPct val="90000"/>
               </a:lnSpc>
               <a:spcBef>
                 <a:spcPts val="751"/>
               </a:spcBef>
-              <a:buClr>
-                <a:srgbClr val="404040"/>
-              </a:buClr>
-              <a:buFont typeface="StarSymbol"/>
-              <a:buChar char="-"/>
-            </a:pPr>
-            <a:r>
-              <a:rPr b="0" lang="en-US" sz="2800" spc="-1" strike="noStrike">
+            </a:pPr>
+            <a:r>
+              <a:rPr b="0" lang="en-US" sz="2200" spc="-1" strike="noStrike">
                 <a:solidFill>
                   <a:srgbClr val="404040"/>
                 </a:solidFill>
                 <a:latin typeface="Calibri"/>
                 <a:ea typeface="DejaVu Sans"/>
               </a:rPr>
-              <a:t>Duyệt qua các item rồi chọn bin đầu tiên thỏa mãn thỏa mãn các điều kiện về cận trên của tổng W, P, T, R trong tập binIndices của item đó</a:t>
-            </a:r>
-            <a:endParaRPr b="0" lang="en-US" sz="2800" spc="-1" strike="noStrike">
+              <a:t>- Là một kỹ thuật tối ưu thuộc họ tìm kiếm cục bộ</a:t>
+            </a:r>
+            <a:endParaRPr b="0" lang="en-US" sz="2200" spc="-1" strike="noStrike">
               <a:latin typeface="Arial"/>
             </a:endParaRPr>
           </a:p>
@@ -6686,7 +7587,17 @@
                 <a:spcPts val="751"/>
               </a:spcBef>
             </a:pPr>
-            <a:endParaRPr b="0" lang="en-US" sz="2800" spc="-1" strike="noStrike">
+            <a:r>
+              <a:rPr b="0" lang="en-US" sz="2200" spc="-1" strike="noStrike">
+                <a:solidFill>
+                  <a:srgbClr val="404040"/>
+                </a:solidFill>
+                <a:latin typeface="Calibri"/>
+                <a:ea typeface="DejaVu Sans"/>
+              </a:rPr>
+              <a:t>- Ở trạng thái hiện tại, ta xem trạng thái tiếp theo nào tốt nhất thì ta sẽ đi theo trạng thái đó.</a:t>
+            </a:r>
+            <a:endParaRPr b="0" lang="en-US" sz="2200" spc="-1" strike="noStrike">
               <a:latin typeface="Arial"/>
             </a:endParaRPr>
           </a:p>
@@ -6750,7 +7661,7 @@
         <p:spPr>
           <a:xfrm>
             <a:off x="488880" y="-87480"/>
-            <a:ext cx="8025840" cy="1324800"/>
+            <a:ext cx="8025120" cy="1324080"/>
           </a:xfrm>
           <a:prstGeom prst="rect">
             <a:avLst/>
@@ -6766,6 +7677,33 @@
           <a:effectRef idx="0"/>
           <a:fontRef idx="minor"/>
         </p:style>
+        <p:txBody>
+          <a:bodyPr lIns="90000" rIns="90000" tIns="45000" bIns="45000" anchor="ctr">
+            <a:normAutofit/>
+          </a:bodyPr>
+          <a:p>
+            <a:pPr>
+              <a:lnSpc>
+                <a:spcPct val="90000"/>
+              </a:lnSpc>
+            </a:pPr>
+            <a:br/>
+            <a:r>
+              <a:rPr b="1" lang="en-US" sz="3600" spc="-1" strike="noStrike">
+                <a:solidFill>
+                  <a:srgbClr val="ffffff"/>
+                </a:solidFill>
+                <a:latin typeface="Calibri"/>
+                <a:ea typeface="DejaVu Sans"/>
+              </a:rPr>
+              <a:t>2.3. Thuật toán tìm kiếm</a:t>
+            </a:r>
+            <a:br/>
+            <a:endParaRPr b="0" lang="en-US" sz="3600" spc="-1" strike="noStrike">
+              <a:latin typeface="Arial"/>
+            </a:endParaRPr>
+          </a:p>
+        </p:txBody>
       </p:sp>
       <p:sp>
         <p:nvSpPr>
@@ -6776,7 +7714,7 @@
         <p:spPr>
           <a:xfrm>
             <a:off x="488880" y="1346040"/>
-            <a:ext cx="8319600" cy="4901400"/>
+            <a:ext cx="8025120" cy="4900680"/>
           </a:xfrm>
           <a:prstGeom prst="rect">
             <a:avLst/>
@@ -6795,13 +7733,44 @@
         <p:txBody>
           <a:bodyPr lIns="90000" rIns="90000" tIns="45000" bIns="45000"/>
           <a:p>
-            <a:pPr marL="343440" algn="just">
-              <a:lnSpc>
-                <a:spcPct val="90000"/>
-              </a:lnSpc>
-              <a:spcBef>
-                <a:spcPts val="374"/>
-              </a:spcBef>
+            <a:pPr>
+              <a:lnSpc>
+                <a:spcPct val="90000"/>
+              </a:lnSpc>
+              <a:spcBef>
+                <a:spcPts val="751"/>
+              </a:spcBef>
+            </a:pPr>
+            <a:endParaRPr b="0" lang="en-US" sz="1800" spc="-1" strike="noStrike">
+              <a:latin typeface="Arial"/>
+            </a:endParaRPr>
+          </a:p>
+          <a:p>
+            <a:pPr>
+              <a:lnSpc>
+                <a:spcPct val="90000"/>
+              </a:lnSpc>
+              <a:spcBef>
+                <a:spcPts val="751"/>
+              </a:spcBef>
+            </a:pPr>
+            <a:endParaRPr b="0" lang="en-US" sz="1800" spc="-1" strike="noStrike">
+              <a:latin typeface="Arial"/>
+            </a:endParaRPr>
+          </a:p>
+          <a:p>
+            <a:pPr marL="343080" indent="-342000">
+              <a:lnSpc>
+                <a:spcPct val="90000"/>
+              </a:lnSpc>
+              <a:spcBef>
+                <a:spcPts val="751"/>
+              </a:spcBef>
+              <a:buClr>
+                <a:srgbClr val="404040"/>
+              </a:buClr>
+              <a:buFont typeface="StarSymbol"/>
+              <a:buChar char="-"/>
             </a:pPr>
             <a:r>
               <a:rPr b="0" lang="en-US" sz="2400" spc="-1" strike="noStrike">
@@ -6811,20 +7780,25 @@
                 <a:latin typeface="Calibri"/>
                 <a:ea typeface="DejaVu Sans"/>
               </a:rPr>
-              <a:t>Mô hình thuật toán:</a:t>
+              <a:t>Hàm getAssignDelta( idx, bin): trả về lượng thay đổi vi phạm khi thay đổi giá trị tại vị trí idx bằng bin</a:t>
             </a:r>
             <a:endParaRPr b="0" lang="en-US" sz="2400" spc="-1" strike="noStrike">
               <a:latin typeface="Arial"/>
             </a:endParaRPr>
           </a:p>
           <a:p>
-            <a:pPr marL="343440" algn="just">
-              <a:lnSpc>
-                <a:spcPct val="90000"/>
-              </a:lnSpc>
-              <a:spcBef>
-                <a:spcPts val="374"/>
-              </a:spcBef>
+            <a:pPr marL="343080" indent="-342000">
+              <a:lnSpc>
+                <a:spcPct val="90000"/>
+              </a:lnSpc>
+              <a:spcBef>
+                <a:spcPts val="751"/>
+              </a:spcBef>
+              <a:buClr>
+                <a:srgbClr val="404040"/>
+              </a:buClr>
+              <a:buFont typeface="StarSymbol"/>
+              <a:buChar char="-"/>
             </a:pPr>
             <a:r>
               <a:rPr b="0" lang="en-US" sz="2400" spc="-1" strike="noStrike">
@@ -6834,140 +7808,9 @@
                 <a:latin typeface="Calibri"/>
                 <a:ea typeface="DejaVu Sans"/>
               </a:rPr>
-              <a:t>Khai báo các class:</a:t>
+              <a:t>Tính lượng thay đổi violation của idx trước khi thay đổi bin và sau khi thay đổi bin.</a:t>
             </a:r>
             <a:endParaRPr b="0" lang="en-US" sz="2400" spc="-1" strike="noStrike">
-              <a:latin typeface="Arial"/>
-            </a:endParaRPr>
-          </a:p>
-          <a:p>
-            <a:pPr marL="343440" algn="just">
-              <a:lnSpc>
-                <a:spcPct val="90000"/>
-              </a:lnSpc>
-              <a:spcBef>
-                <a:spcPts val="374"/>
-              </a:spcBef>
-            </a:pPr>
-            <a:r>
-              <a:rPr b="0" lang="en-US" sz="2400" spc="-1" strike="noStrike">
-                <a:solidFill>
-                  <a:srgbClr val="404040"/>
-                </a:solidFill>
-                <a:latin typeface="Calibri"/>
-                <a:ea typeface="DejaVu Sans"/>
-              </a:rPr>
-              <a:t>Gen: Là các item có các thuộc tính w, p, t, r của item đó</a:t>
-            </a:r>
-            <a:endParaRPr b="0" lang="en-US" sz="2400" spc="-1" strike="noStrike">
-              <a:latin typeface="Arial"/>
-            </a:endParaRPr>
-          </a:p>
-          <a:p>
-            <a:pPr marL="343440" algn="just">
-              <a:lnSpc>
-                <a:spcPct val="90000"/>
-              </a:lnSpc>
-              <a:spcBef>
-                <a:spcPts val="374"/>
-              </a:spcBef>
-            </a:pPr>
-            <a:r>
-              <a:rPr b="0" lang="en-US" sz="2400" spc="-1" strike="noStrike">
-                <a:solidFill>
-                  <a:srgbClr val="404040"/>
-                </a:solidFill>
-                <a:latin typeface="Calibri"/>
-                <a:ea typeface="DejaVu Sans"/>
-              </a:rPr>
-              <a:t>Individual: Là tập n các Gen, một solution cho bài toán</a:t>
-            </a:r>
-            <a:endParaRPr b="0" lang="en-US" sz="2400" spc="-1" strike="noStrike">
-              <a:latin typeface="Arial"/>
-            </a:endParaRPr>
-          </a:p>
-          <a:p>
-            <a:pPr marL="343440" algn="just">
-              <a:lnSpc>
-                <a:spcPct val="90000"/>
-              </a:lnSpc>
-              <a:spcBef>
-                <a:spcPts val="374"/>
-              </a:spcBef>
-            </a:pPr>
-            <a:r>
-              <a:rPr b="0" lang="en-US" sz="2400" spc="-1" strike="noStrike">
-                <a:solidFill>
-                  <a:srgbClr val="404040"/>
-                </a:solidFill>
-                <a:latin typeface="Calibri"/>
-                <a:ea typeface="DejaVu Sans"/>
-              </a:rPr>
-              <a:t>Population: Là tập các Individual các solution có thể của bài toán</a:t>
-            </a:r>
-            <a:endParaRPr b="0" lang="en-US" sz="2400" spc="-1" strike="noStrike">
-              <a:latin typeface="Arial"/>
-            </a:endParaRPr>
-          </a:p>
-          <a:p>
-            <a:pPr marL="343440" algn="just">
-              <a:lnSpc>
-                <a:spcPct val="90000"/>
-              </a:lnSpc>
-              <a:spcBef>
-                <a:spcPts val="374"/>
-              </a:spcBef>
-            </a:pPr>
-            <a:endParaRPr b="0" lang="en-US" sz="2400" spc="-1" strike="noStrike">
-              <a:latin typeface="Arial"/>
-            </a:endParaRPr>
-          </a:p>
-        </p:txBody>
-      </p:sp>
-      <p:sp>
-        <p:nvSpPr>
-          <p:cNvPr id="97" name="CustomShape 3"/>
-          <p:cNvSpPr/>
-          <p:nvPr/>
-        </p:nvSpPr>
-        <p:spPr>
-          <a:xfrm>
-            <a:off x="398880" y="-151560"/>
-            <a:ext cx="8025840" cy="1324800"/>
-          </a:xfrm>
-          <a:prstGeom prst="rect">
-            <a:avLst/>
-          </a:prstGeom>
-          <a:noFill/>
-          <a:ln>
-            <a:noFill/>
-          </a:ln>
-        </p:spPr>
-        <p:style>
-          <a:lnRef idx="0"/>
-          <a:fillRef idx="0"/>
-          <a:effectRef idx="0"/>
-          <a:fontRef idx="minor"/>
-        </p:style>
-        <p:txBody>
-          <a:bodyPr lIns="90000" rIns="90000" tIns="45000" bIns="45000" anchor="ctr"/>
-          <a:p>
-            <a:pPr>
-              <a:lnSpc>
-                <a:spcPct val="90000"/>
-              </a:lnSpc>
-            </a:pPr>
-            <a:r>
-              <a:rPr b="1" lang="en-US" sz="3600" spc="-1" strike="noStrike">
-                <a:solidFill>
-                  <a:srgbClr val="ffffff"/>
-                </a:solidFill>
-                <a:latin typeface="Calibri"/>
-                <a:ea typeface="DejaVu Sans"/>
-              </a:rPr>
-              <a:t>3. Genetic Algorithm</a:t>
-            </a:r>
-            <a:endParaRPr b="0" lang="en-US" sz="3600" spc="-1" strike="noStrike">
               <a:latin typeface="Arial"/>
             </a:endParaRPr>
           </a:p>

</xml_diff>